<commit_message>
Final commit - 2
</commit_message>
<xml_diff>
--- a/Исследование равновесий в модели A Landscape Theory of Aggregation.pptx
+++ b/Исследование равновесий в модели A Landscape Theory of Aggregation.pptx
@@ -5,23 +5,24 @@
     <p:sldMasterId id="2147483888" r:id="rId1"/>
   </p:sldMasterIdLst>
   <p:notesMasterIdLst>
-    <p:notesMasterId r:id="rId16"/>
+    <p:notesMasterId r:id="rId17"/>
   </p:notesMasterIdLst>
   <p:sldIdLst>
     <p:sldId id="256" r:id="rId2"/>
-    <p:sldId id="257" r:id="rId3"/>
-    <p:sldId id="259" r:id="rId4"/>
-    <p:sldId id="260" r:id="rId5"/>
-    <p:sldId id="261" r:id="rId6"/>
-    <p:sldId id="262" r:id="rId7"/>
-    <p:sldId id="272" r:id="rId8"/>
-    <p:sldId id="264" r:id="rId9"/>
-    <p:sldId id="265" r:id="rId10"/>
-    <p:sldId id="267" r:id="rId11"/>
-    <p:sldId id="269" r:id="rId12"/>
-    <p:sldId id="270" r:id="rId13"/>
-    <p:sldId id="268" r:id="rId14"/>
-    <p:sldId id="271" r:id="rId15"/>
+    <p:sldId id="273" r:id="rId3"/>
+    <p:sldId id="257" r:id="rId4"/>
+    <p:sldId id="259" r:id="rId5"/>
+    <p:sldId id="260" r:id="rId6"/>
+    <p:sldId id="261" r:id="rId7"/>
+    <p:sldId id="262" r:id="rId8"/>
+    <p:sldId id="272" r:id="rId9"/>
+    <p:sldId id="264" r:id="rId10"/>
+    <p:sldId id="265" r:id="rId11"/>
+    <p:sldId id="267" r:id="rId12"/>
+    <p:sldId id="269" r:id="rId13"/>
+    <p:sldId id="270" r:id="rId14"/>
+    <p:sldId id="268" r:id="rId15"/>
+    <p:sldId id="271" r:id="rId16"/>
   </p:sldIdLst>
   <p:sldSz cx="9144000" cy="6858000" type="screen4x3"/>
   <p:notesSz cx="6858000" cy="9144000"/>
@@ -247,11 +248,11 @@
         </c:dLbls>
         <c:gapWidth val="150"/>
         <c:overlap val="100"/>
-        <c:axId val="34671104"/>
-        <c:axId val="91543168"/>
+        <c:axId val="33315328"/>
+        <c:axId val="97966272"/>
       </c:barChart>
       <c:catAx>
-        <c:axId val="34671104"/>
+        <c:axId val="33315328"/>
         <c:scaling>
           <c:orientation val="minMax"/>
         </c:scaling>
@@ -260,7 +261,7 @@
         <c:majorTickMark val="out"/>
         <c:minorTickMark val="none"/>
         <c:tickLblPos val="nextTo"/>
-        <c:crossAx val="91543168"/>
+        <c:crossAx val="97966272"/>
         <c:crosses val="autoZero"/>
         <c:auto val="1"/>
         <c:lblAlgn val="ctr"/>
@@ -268,7 +269,7 @@
         <c:noMultiLvlLbl val="0"/>
       </c:catAx>
       <c:valAx>
-        <c:axId val="91543168"/>
+        <c:axId val="97966272"/>
         <c:scaling>
           <c:orientation val="minMax"/>
         </c:scaling>
@@ -279,7 +280,7 @@
         <c:majorTickMark val="out"/>
         <c:minorTickMark val="none"/>
         <c:tickLblPos val="nextTo"/>
-        <c:crossAx val="34671104"/>
+        <c:crossAx val="33315328"/>
         <c:crosses val="autoZero"/>
         <c:crossBetween val="between"/>
       </c:valAx>
@@ -407,11 +408,11 @@
         </c:dLbls>
         <c:gapWidth val="150"/>
         <c:overlap val="100"/>
-        <c:axId val="39852544"/>
-        <c:axId val="42075264"/>
+        <c:axId val="121934336"/>
+        <c:axId val="34224320"/>
       </c:barChart>
       <c:catAx>
-        <c:axId val="39852544"/>
+        <c:axId val="121934336"/>
         <c:scaling>
           <c:orientation val="minMax"/>
         </c:scaling>
@@ -421,7 +422,7 @@
         <c:majorTickMark val="out"/>
         <c:minorTickMark val="none"/>
         <c:tickLblPos val="nextTo"/>
-        <c:crossAx val="42075264"/>
+        <c:crossAx val="34224320"/>
         <c:crosses val="autoZero"/>
         <c:auto val="1"/>
         <c:lblAlgn val="ctr"/>
@@ -429,7 +430,7 @@
         <c:noMultiLvlLbl val="0"/>
       </c:catAx>
       <c:valAx>
-        <c:axId val="42075264"/>
+        <c:axId val="34224320"/>
         <c:scaling>
           <c:orientation val="minMax"/>
         </c:scaling>
@@ -440,7 +441,7 @@
         <c:majorTickMark val="out"/>
         <c:minorTickMark val="none"/>
         <c:tickLblPos val="nextTo"/>
-        <c:crossAx val="39852544"/>
+        <c:crossAx val="121934336"/>
         <c:crosses val="autoZero"/>
         <c:crossBetween val="between"/>
       </c:valAx>
@@ -568,11 +569,11 @@
         </c:dLbls>
         <c:gapWidth val="150"/>
         <c:overlap val="100"/>
-        <c:axId val="35020288"/>
-        <c:axId val="42076992"/>
+        <c:axId val="121101312"/>
+        <c:axId val="181739520"/>
       </c:barChart>
       <c:catAx>
-        <c:axId val="35020288"/>
+        <c:axId val="121101312"/>
         <c:scaling>
           <c:orientation val="minMax"/>
         </c:scaling>
@@ -582,7 +583,7 @@
         <c:majorTickMark val="out"/>
         <c:minorTickMark val="none"/>
         <c:tickLblPos val="nextTo"/>
-        <c:crossAx val="42076992"/>
+        <c:crossAx val="181739520"/>
         <c:crosses val="autoZero"/>
         <c:auto val="1"/>
         <c:lblAlgn val="ctr"/>
@@ -590,7 +591,7 @@
         <c:noMultiLvlLbl val="0"/>
       </c:catAx>
       <c:valAx>
-        <c:axId val="42076992"/>
+        <c:axId val="181739520"/>
         <c:scaling>
           <c:orientation val="minMax"/>
         </c:scaling>
@@ -601,7 +602,7 @@
         <c:majorTickMark val="out"/>
         <c:minorTickMark val="none"/>
         <c:tickLblPos val="nextTo"/>
-        <c:crossAx val="35020288"/>
+        <c:crossAx val="121101312"/>
         <c:crosses val="autoZero"/>
         <c:crossBetween val="between"/>
       </c:valAx>
@@ -804,11 +805,11 @@
         </c:dLbls>
         <c:gapWidth val="150"/>
         <c:overlap val="100"/>
-        <c:axId val="34672128"/>
-        <c:axId val="42116224"/>
+        <c:axId val="121833984"/>
+        <c:axId val="181741824"/>
       </c:barChart>
       <c:catAx>
-        <c:axId val="34672128"/>
+        <c:axId val="121833984"/>
         <c:scaling>
           <c:orientation val="minMax"/>
         </c:scaling>
@@ -818,7 +819,7 @@
         <c:majorTickMark val="out"/>
         <c:minorTickMark val="none"/>
         <c:tickLblPos val="nextTo"/>
-        <c:crossAx val="42116224"/>
+        <c:crossAx val="181741824"/>
         <c:crosses val="autoZero"/>
         <c:auto val="1"/>
         <c:lblAlgn val="ctr"/>
@@ -826,7 +827,7 @@
         <c:noMultiLvlLbl val="0"/>
       </c:catAx>
       <c:valAx>
-        <c:axId val="42116224"/>
+        <c:axId val="181741824"/>
         <c:scaling>
           <c:orientation val="minMax"/>
         </c:scaling>
@@ -837,7 +838,7 @@
         <c:majorTickMark val="out"/>
         <c:minorTickMark val="none"/>
         <c:tickLblPos val="nextTo"/>
-        <c:crossAx val="34672128"/>
+        <c:crossAx val="121833984"/>
         <c:crosses val="autoZero"/>
         <c:crossBetween val="between"/>
       </c:valAx>
@@ -1028,11 +1029,11 @@
         </c:dLbls>
         <c:gapWidth val="150"/>
         <c:overlap val="100"/>
-        <c:axId val="147588608"/>
-        <c:axId val="42117376"/>
+        <c:axId val="181843456"/>
+        <c:axId val="181743552"/>
       </c:barChart>
       <c:catAx>
-        <c:axId val="147588608"/>
+        <c:axId val="181843456"/>
         <c:scaling>
           <c:orientation val="minMax"/>
         </c:scaling>
@@ -1042,7 +1043,7 @@
         <c:majorTickMark val="out"/>
         <c:minorTickMark val="none"/>
         <c:tickLblPos val="nextTo"/>
-        <c:crossAx val="42117376"/>
+        <c:crossAx val="181743552"/>
         <c:crosses val="autoZero"/>
         <c:auto val="1"/>
         <c:lblAlgn val="ctr"/>
@@ -1050,7 +1051,7 @@
         <c:noMultiLvlLbl val="0"/>
       </c:catAx>
       <c:valAx>
-        <c:axId val="42117376"/>
+        <c:axId val="181743552"/>
         <c:scaling>
           <c:orientation val="minMax"/>
         </c:scaling>
@@ -1061,7 +1062,7 @@
         <c:majorTickMark val="out"/>
         <c:minorTickMark val="none"/>
         <c:tickLblPos val="nextTo"/>
-        <c:crossAx val="147588608"/>
+        <c:crossAx val="181843456"/>
         <c:crosses val="autoZero"/>
         <c:crossBetween val="between"/>
       </c:valAx>
@@ -1210,11 +1211,11 @@
         </c:dLbls>
         <c:gapWidth val="150"/>
         <c:overlap val="100"/>
-        <c:axId val="34986496"/>
-        <c:axId val="150022400"/>
+        <c:axId val="121936384"/>
+        <c:axId val="38945920"/>
       </c:barChart>
       <c:catAx>
-        <c:axId val="34986496"/>
+        <c:axId val="121936384"/>
         <c:scaling>
           <c:orientation val="minMax"/>
         </c:scaling>
@@ -1223,7 +1224,7 @@
         <c:majorTickMark val="out"/>
         <c:minorTickMark val="none"/>
         <c:tickLblPos val="nextTo"/>
-        <c:crossAx val="150022400"/>
+        <c:crossAx val="38945920"/>
         <c:crosses val="autoZero"/>
         <c:auto val="1"/>
         <c:lblAlgn val="ctr"/>
@@ -1231,7 +1232,7 @@
         <c:noMultiLvlLbl val="0"/>
       </c:catAx>
       <c:valAx>
-        <c:axId val="150022400"/>
+        <c:axId val="38945920"/>
         <c:scaling>
           <c:orientation val="minMax"/>
         </c:scaling>
@@ -1242,7 +1243,7 @@
         <c:majorTickMark val="out"/>
         <c:minorTickMark val="none"/>
         <c:tickLblPos val="nextTo"/>
-        <c:crossAx val="34986496"/>
+        <c:crossAx val="121936384"/>
         <c:crosses val="autoZero"/>
         <c:crossBetween val="between"/>
       </c:valAx>
@@ -1391,11 +1392,11 @@
         </c:dLbls>
         <c:gapWidth val="150"/>
         <c:overlap val="100"/>
-        <c:axId val="34669568"/>
-        <c:axId val="150024128"/>
+        <c:axId val="33316352"/>
+        <c:axId val="38947648"/>
       </c:barChart>
       <c:catAx>
-        <c:axId val="34669568"/>
+        <c:axId val="33316352"/>
         <c:scaling>
           <c:orientation val="minMax"/>
         </c:scaling>
@@ -1404,7 +1405,7 @@
         <c:majorTickMark val="out"/>
         <c:minorTickMark val="none"/>
         <c:tickLblPos val="nextTo"/>
-        <c:crossAx val="150024128"/>
+        <c:crossAx val="38947648"/>
         <c:crosses val="autoZero"/>
         <c:auto val="1"/>
         <c:lblAlgn val="ctr"/>
@@ -1412,7 +1413,7 @@
         <c:noMultiLvlLbl val="0"/>
       </c:catAx>
       <c:valAx>
-        <c:axId val="150024128"/>
+        <c:axId val="38947648"/>
         <c:scaling>
           <c:orientation val="minMax"/>
         </c:scaling>
@@ -1423,7 +1424,7 @@
         <c:majorTickMark val="out"/>
         <c:minorTickMark val="none"/>
         <c:tickLblPos val="nextTo"/>
-        <c:crossAx val="34669568"/>
+        <c:crossAx val="33316352"/>
         <c:crosses val="autoZero"/>
         <c:crossBetween val="between"/>
       </c:valAx>
@@ -1572,11 +1573,11 @@
         </c:dLbls>
         <c:gapWidth val="150"/>
         <c:overlap val="100"/>
-        <c:axId val="34987008"/>
-        <c:axId val="150025856"/>
+        <c:axId val="121832960"/>
+        <c:axId val="38949376"/>
       </c:barChart>
       <c:catAx>
-        <c:axId val="34987008"/>
+        <c:axId val="121832960"/>
         <c:scaling>
           <c:orientation val="minMax"/>
         </c:scaling>
@@ -1585,7 +1586,7 @@
         <c:majorTickMark val="out"/>
         <c:minorTickMark val="none"/>
         <c:tickLblPos val="nextTo"/>
-        <c:crossAx val="150025856"/>
+        <c:crossAx val="38949376"/>
         <c:crossesAt val="0"/>
         <c:auto val="1"/>
         <c:lblAlgn val="ctr"/>
@@ -1593,7 +1594,7 @@
         <c:noMultiLvlLbl val="0"/>
       </c:catAx>
       <c:valAx>
-        <c:axId val="150025856"/>
+        <c:axId val="38949376"/>
         <c:scaling>
           <c:orientation val="minMax"/>
           <c:min val="0"/>
@@ -1605,7 +1606,7 @@
         <c:majorTickMark val="out"/>
         <c:minorTickMark val="none"/>
         <c:tickLblPos val="nextTo"/>
-        <c:crossAx val="34987008"/>
+        <c:crossAx val="121832960"/>
         <c:crosses val="autoZero"/>
         <c:crossBetween val="between"/>
       </c:valAx>
@@ -1715,11 +1716,11 @@
         </c:dLbls>
         <c:gapWidth val="150"/>
         <c:overlap val="100"/>
-        <c:axId val="34984448"/>
-        <c:axId val="150026432"/>
+        <c:axId val="121100800"/>
+        <c:axId val="34238976"/>
       </c:barChart>
       <c:catAx>
-        <c:axId val="34984448"/>
+        <c:axId val="121100800"/>
         <c:scaling>
           <c:orientation val="minMax"/>
         </c:scaling>
@@ -1729,7 +1730,7 @@
         <c:majorTickMark val="out"/>
         <c:minorTickMark val="none"/>
         <c:tickLblPos val="nextTo"/>
-        <c:crossAx val="150026432"/>
+        <c:crossAx val="34238976"/>
         <c:crosses val="autoZero"/>
         <c:auto val="1"/>
         <c:lblAlgn val="ctr"/>
@@ -1737,7 +1738,7 @@
         <c:noMultiLvlLbl val="0"/>
       </c:catAx>
       <c:valAx>
-        <c:axId val="150026432"/>
+        <c:axId val="34238976"/>
         <c:scaling>
           <c:orientation val="minMax"/>
         </c:scaling>
@@ -1748,7 +1749,7 @@
         <c:majorTickMark val="out"/>
         <c:minorTickMark val="none"/>
         <c:tickLblPos val="nextTo"/>
-        <c:crossAx val="34984448"/>
+        <c:crossAx val="121100800"/>
         <c:crosses val="autoZero"/>
         <c:crossBetween val="between"/>
       </c:valAx>
@@ -1876,11 +1877,11 @@
         </c:dLbls>
         <c:gapWidth val="150"/>
         <c:overlap val="100"/>
-        <c:axId val="35018240"/>
-        <c:axId val="39732928"/>
+        <c:axId val="121834496"/>
+        <c:axId val="38944768"/>
       </c:barChart>
       <c:catAx>
-        <c:axId val="35018240"/>
+        <c:axId val="121834496"/>
         <c:scaling>
           <c:orientation val="minMax"/>
         </c:scaling>
@@ -1890,7 +1891,7 @@
         <c:majorTickMark val="out"/>
         <c:minorTickMark val="none"/>
         <c:tickLblPos val="nextTo"/>
-        <c:crossAx val="39732928"/>
+        <c:crossAx val="38944768"/>
         <c:crosses val="autoZero"/>
         <c:auto val="1"/>
         <c:lblAlgn val="ctr"/>
@@ -1898,7 +1899,7 @@
         <c:noMultiLvlLbl val="0"/>
       </c:catAx>
       <c:valAx>
-        <c:axId val="39732928"/>
+        <c:axId val="38944768"/>
         <c:scaling>
           <c:orientation val="minMax"/>
         </c:scaling>
@@ -1909,7 +1910,7 @@
         <c:majorTickMark val="out"/>
         <c:minorTickMark val="none"/>
         <c:tickLblPos val="nextTo"/>
-        <c:crossAx val="35018240"/>
+        <c:crossAx val="121834496"/>
         <c:crosses val="autoZero"/>
         <c:crossBetween val="between"/>
       </c:valAx>
@@ -2043,11 +2044,11 @@
         </c:dLbls>
         <c:gapWidth val="150"/>
         <c:overlap val="100"/>
-        <c:axId val="34529280"/>
-        <c:axId val="39734656"/>
+        <c:axId val="147403264"/>
+        <c:axId val="34219136"/>
       </c:barChart>
       <c:catAx>
-        <c:axId val="34529280"/>
+        <c:axId val="147403264"/>
         <c:scaling>
           <c:orientation val="minMax"/>
         </c:scaling>
@@ -2057,7 +2058,7 @@
         <c:majorTickMark val="out"/>
         <c:minorTickMark val="none"/>
         <c:tickLblPos val="nextTo"/>
-        <c:crossAx val="39734656"/>
+        <c:crossAx val="34219136"/>
         <c:crosses val="autoZero"/>
         <c:auto val="1"/>
         <c:lblAlgn val="ctr"/>
@@ -2065,7 +2066,7 @@
         <c:noMultiLvlLbl val="0"/>
       </c:catAx>
       <c:valAx>
-        <c:axId val="39734656"/>
+        <c:axId val="34219136"/>
         <c:scaling>
           <c:orientation val="minMax"/>
         </c:scaling>
@@ -2076,7 +2077,7 @@
         <c:majorTickMark val="out"/>
         <c:minorTickMark val="none"/>
         <c:tickLblPos val="nextTo"/>
-        <c:crossAx val="34529280"/>
+        <c:crossAx val="147403264"/>
         <c:crosses val="autoZero"/>
         <c:crossBetween val="between"/>
       </c:valAx>
@@ -2261,11 +2262,11 @@
         </c:dLbls>
         <c:gapWidth val="150"/>
         <c:overlap val="100"/>
-        <c:axId val="35019264"/>
-        <c:axId val="39736384"/>
+        <c:axId val="121937408"/>
+        <c:axId val="34220288"/>
       </c:barChart>
       <c:catAx>
-        <c:axId val="35019264"/>
+        <c:axId val="121937408"/>
         <c:scaling>
           <c:orientation val="minMax"/>
         </c:scaling>
@@ -2275,7 +2276,7 @@
         <c:majorTickMark val="out"/>
         <c:minorTickMark val="none"/>
         <c:tickLblPos val="nextTo"/>
-        <c:crossAx val="39736384"/>
+        <c:crossAx val="34220288"/>
         <c:crosses val="autoZero"/>
         <c:auto val="1"/>
         <c:lblAlgn val="ctr"/>
@@ -2283,7 +2284,7 @@
         <c:noMultiLvlLbl val="0"/>
       </c:catAx>
       <c:valAx>
-        <c:axId val="39736384"/>
+        <c:axId val="34220288"/>
         <c:scaling>
           <c:orientation val="minMax"/>
         </c:scaling>
@@ -2294,7 +2295,7 @@
         <c:majorTickMark val="out"/>
         <c:minorTickMark val="none"/>
         <c:tickLblPos val="nextTo"/>
-        <c:crossAx val="35019264"/>
+        <c:crossAx val="121937408"/>
         <c:crosses val="autoZero"/>
         <c:crossBetween val="between"/>
       </c:valAx>
@@ -2410,11 +2411,11 @@
         </c:dLbls>
         <c:gapWidth val="150"/>
         <c:overlap val="100"/>
-        <c:axId val="34530304"/>
-        <c:axId val="39738688"/>
+        <c:axId val="33313792"/>
+        <c:axId val="34222592"/>
       </c:barChart>
       <c:catAx>
-        <c:axId val="34530304"/>
+        <c:axId val="33313792"/>
         <c:scaling>
           <c:orientation val="minMax"/>
         </c:scaling>
@@ -2424,7 +2425,7 @@
         <c:majorTickMark val="out"/>
         <c:minorTickMark val="none"/>
         <c:tickLblPos val="nextTo"/>
-        <c:crossAx val="39738688"/>
+        <c:crossAx val="34222592"/>
         <c:crosses val="autoZero"/>
         <c:auto val="1"/>
         <c:lblAlgn val="ctr"/>
@@ -2432,7 +2433,7 @@
         <c:noMultiLvlLbl val="0"/>
       </c:catAx>
       <c:valAx>
-        <c:axId val="39738688"/>
+        <c:axId val="34222592"/>
         <c:scaling>
           <c:orientation val="minMax"/>
         </c:scaling>
@@ -2443,7 +2444,7 @@
         <c:majorTickMark val="out"/>
         <c:minorTickMark val="none"/>
         <c:tickLblPos val="nextTo"/>
-        <c:crossAx val="34530304"/>
+        <c:crossAx val="33313792"/>
         <c:crosses val="autoZero"/>
         <c:crossBetween val="between"/>
       </c:valAx>
@@ -2883,7 +2884,7 @@
           <a:p>
             <a:fld id="{0879E3F4-BD56-4E64-A445-FCB31ECA99B1}" type="slidenum">
               <a:rPr lang="ru-RU" smtClean="0"/>
-              <a:t>2</a:t>
+              <a:t>3</a:t>
             </a:fld>
             <a:endParaRPr lang="ru-RU"/>
           </a:p>
@@ -2967,7 +2968,7 @@
           <a:p>
             <a:fld id="{0879E3F4-BD56-4E64-A445-FCB31ECA99B1}" type="slidenum">
               <a:rPr lang="ru-RU" smtClean="0"/>
-              <a:t>11</a:t>
+              <a:t>12</a:t>
             </a:fld>
             <a:endParaRPr lang="ru-RU"/>
           </a:p>
@@ -6721,8 +6722,8 @@
         </p:nvSpPr>
         <p:spPr>
           <a:xfrm>
-            <a:off x="683568" y="116632"/>
-            <a:ext cx="7776864" cy="1368152"/>
+            <a:off x="179512" y="404664"/>
+            <a:ext cx="8773414" cy="648072"/>
           </a:xfrm>
         </p:spPr>
         <p:txBody>
@@ -6730,10 +6731,10 @@
           <a:lstStyle/>
           <a:p>
             <a:r>
-              <a:rPr lang="ru-RU" sz="4400" dirty="0" smtClean="0"/>
-              <a:t>Кол-во симметричных ребер в графах с равновесиями</a:t>
-            </a:r>
-            <a:endParaRPr lang="ru-RU" sz="4400" dirty="0"/>
+              <a:rPr lang="ru-RU" sz="3200" dirty="0" smtClean="0"/>
+              <a:t>Кол-во графов с равновесными разбиениями</a:t>
+            </a:r>
+            <a:endParaRPr lang="ru-RU" sz="3200" dirty="0"/>
           </a:p>
         </p:txBody>
       </p:sp>
@@ -6744,14 +6745,14 @@
           <p:nvPr>
             <p:extLst>
               <p:ext uri="{D42A27DB-BD31-4B8C-83A1-F6EECF244321}">
-                <p14:modId xmlns:p14="http://schemas.microsoft.com/office/powerpoint/2010/main" val="1581353856"/>
+                <p14:modId xmlns:p14="http://schemas.microsoft.com/office/powerpoint/2010/main" val="2798858105"/>
               </p:ext>
             </p:extLst>
           </p:nvPr>
         </p:nvGraphicFramePr>
         <p:xfrm>
           <a:off x="539552" y="1484784"/>
-          <a:ext cx="2088232" cy="2608064"/>
+          <a:ext cx="2399928" cy="2608064"/>
         </p:xfrm>
         <a:graphic>
           <a:graphicData uri="http://schemas.openxmlformats.org/drawingml/2006/chart">
@@ -6761,19 +6762,19 @@
       </p:graphicFrame>
       <p:graphicFrame>
         <p:nvGraphicFramePr>
-          <p:cNvPr id="12" name="Диаграмма 11"/>
+          <p:cNvPr id="9" name="Диаграмма 8"/>
           <p:cNvGraphicFramePr/>
           <p:nvPr>
             <p:extLst>
               <p:ext uri="{D42A27DB-BD31-4B8C-83A1-F6EECF244321}">
-                <p14:modId xmlns:p14="http://schemas.microsoft.com/office/powerpoint/2010/main" val="3920075693"/>
+                <p14:modId xmlns:p14="http://schemas.microsoft.com/office/powerpoint/2010/main" val="903869551"/>
               </p:ext>
             </p:extLst>
           </p:nvPr>
         </p:nvGraphicFramePr>
         <p:xfrm>
-          <a:off x="539552" y="4157219"/>
-          <a:ext cx="2088232" cy="2608064"/>
+          <a:off x="539552" y="4077072"/>
+          <a:ext cx="2399928" cy="2608064"/>
         </p:xfrm>
         <a:graphic>
           <a:graphicData uri="http://schemas.openxmlformats.org/drawingml/2006/chart">
@@ -6783,19 +6784,19 @@
       </p:graphicFrame>
       <p:graphicFrame>
         <p:nvGraphicFramePr>
-          <p:cNvPr id="13" name="Диаграмма 12"/>
+          <p:cNvPr id="10" name="Диаграмма 9"/>
           <p:cNvGraphicFramePr/>
           <p:nvPr>
             <p:extLst>
               <p:ext uri="{D42A27DB-BD31-4B8C-83A1-F6EECF244321}">
-                <p14:modId xmlns:p14="http://schemas.microsoft.com/office/powerpoint/2010/main" val="1956686003"/>
+                <p14:modId xmlns:p14="http://schemas.microsoft.com/office/powerpoint/2010/main" val="409462323"/>
               </p:ext>
             </p:extLst>
           </p:nvPr>
         </p:nvGraphicFramePr>
         <p:xfrm>
-          <a:off x="2555776" y="1556792"/>
-          <a:ext cx="3312368" cy="5301208"/>
+          <a:off x="3851920" y="1484784"/>
+          <a:ext cx="2399928" cy="2608064"/>
         </p:xfrm>
         <a:graphic>
           <a:graphicData uri="http://schemas.openxmlformats.org/drawingml/2006/chart">
@@ -6805,19 +6806,19 @@
       </p:graphicFrame>
       <p:graphicFrame>
         <p:nvGraphicFramePr>
-          <p:cNvPr id="14" name="Диаграмма 13"/>
+          <p:cNvPr id="11" name="Диаграмма 10"/>
           <p:cNvGraphicFramePr/>
           <p:nvPr>
             <p:extLst>
               <p:ext uri="{D42A27DB-BD31-4B8C-83A1-F6EECF244321}">
-                <p14:modId xmlns:p14="http://schemas.microsoft.com/office/powerpoint/2010/main" val="3108317785"/>
+                <p14:modId xmlns:p14="http://schemas.microsoft.com/office/powerpoint/2010/main" val="508284211"/>
               </p:ext>
             </p:extLst>
           </p:nvPr>
         </p:nvGraphicFramePr>
         <p:xfrm>
-          <a:off x="5831632" y="1556792"/>
-          <a:ext cx="3312368" cy="5301208"/>
+          <a:off x="3851920" y="4077072"/>
+          <a:ext cx="2399928" cy="2608064"/>
         </p:xfrm>
         <a:graphic>
           <a:graphicData uri="http://schemas.openxmlformats.org/drawingml/2006/chart">
@@ -6825,10 +6826,168 @@
           </a:graphicData>
         </a:graphic>
       </p:graphicFrame>
+      <p:sp>
+        <p:nvSpPr>
+          <p:cNvPr id="13" name="Прямоугольник 12"/>
+          <p:cNvSpPr/>
+          <p:nvPr/>
+        </p:nvSpPr>
+        <p:spPr>
+          <a:xfrm>
+            <a:off x="6615991" y="2988883"/>
+            <a:ext cx="432048" cy="432048"/>
+          </a:xfrm>
+          <a:prstGeom prst="rect">
+            <a:avLst/>
+          </a:prstGeom>
+          <a:solidFill>
+            <a:srgbClr val="FF0000"/>
+          </a:solidFill>
+          <a:ln>
+            <a:solidFill>
+              <a:schemeClr val="tx1"/>
+            </a:solidFill>
+          </a:ln>
+        </p:spPr>
+        <p:style>
+          <a:lnRef idx="2">
+            <a:schemeClr val="accent1">
+              <a:shade val="50000"/>
+            </a:schemeClr>
+          </a:lnRef>
+          <a:fillRef idx="1">
+            <a:schemeClr val="accent1"/>
+          </a:fillRef>
+          <a:effectRef idx="0">
+            <a:schemeClr val="accent1"/>
+          </a:effectRef>
+          <a:fontRef idx="minor">
+            <a:schemeClr val="lt1"/>
+          </a:fontRef>
+        </p:style>
+        <p:txBody>
+          <a:bodyPr rtlCol="0" anchor="ctr"/>
+          <a:lstStyle/>
+          <a:p>
+            <a:pPr algn="ctr"/>
+            <a:endParaRPr lang="ru-RU"/>
+          </a:p>
+        </p:txBody>
+      </p:sp>
+      <p:sp>
+        <p:nvSpPr>
+          <p:cNvPr id="14" name="Прямоугольник 13"/>
+          <p:cNvSpPr/>
+          <p:nvPr/>
+        </p:nvSpPr>
+        <p:spPr>
+          <a:xfrm>
+            <a:off x="6604429" y="4506563"/>
+            <a:ext cx="432048" cy="432048"/>
+          </a:xfrm>
+          <a:prstGeom prst="rect">
+            <a:avLst/>
+          </a:prstGeom>
+          <a:solidFill>
+            <a:srgbClr val="92D050"/>
+          </a:solidFill>
+          <a:ln>
+            <a:solidFill>
+              <a:schemeClr val="tx1"/>
+            </a:solidFill>
+          </a:ln>
+        </p:spPr>
+        <p:style>
+          <a:lnRef idx="2">
+            <a:schemeClr val="accent1">
+              <a:shade val="50000"/>
+            </a:schemeClr>
+          </a:lnRef>
+          <a:fillRef idx="1">
+            <a:schemeClr val="accent1"/>
+          </a:fillRef>
+          <a:effectRef idx="0">
+            <a:schemeClr val="accent1"/>
+          </a:effectRef>
+          <a:fontRef idx="minor">
+            <a:schemeClr val="lt1"/>
+          </a:fontRef>
+        </p:style>
+        <p:txBody>
+          <a:bodyPr rtlCol="0" anchor="ctr"/>
+          <a:lstStyle/>
+          <a:p>
+            <a:pPr algn="ctr"/>
+            <a:endParaRPr lang="ru-RU"/>
+          </a:p>
+        </p:txBody>
+      </p:sp>
+      <p:sp>
+        <p:nvSpPr>
+          <p:cNvPr id="15" name="TextBox 14"/>
+          <p:cNvSpPr txBox="1"/>
+          <p:nvPr/>
+        </p:nvSpPr>
+        <p:spPr>
+          <a:xfrm>
+            <a:off x="7152726" y="2591157"/>
+            <a:ext cx="1800200" cy="923330"/>
+          </a:xfrm>
+          <a:prstGeom prst="rect">
+            <a:avLst/>
+          </a:prstGeom>
+          <a:noFill/>
+        </p:spPr>
+        <p:txBody>
+          <a:bodyPr wrap="square" rtlCol="0">
+            <a:spAutoFit/>
+          </a:bodyPr>
+          <a:lstStyle/>
+          <a:p>
+            <a:r>
+              <a:rPr lang="ru-RU" dirty="0" smtClean="0"/>
+              <a:t>Кол-во графов без равновесий</a:t>
+            </a:r>
+            <a:endParaRPr lang="ru-RU" dirty="0"/>
+          </a:p>
+        </p:txBody>
+      </p:sp>
+      <p:sp>
+        <p:nvSpPr>
+          <p:cNvPr id="16" name="TextBox 15"/>
+          <p:cNvSpPr txBox="1"/>
+          <p:nvPr/>
+        </p:nvSpPr>
+        <p:spPr>
+          <a:xfrm>
+            <a:off x="7152726" y="4260922"/>
+            <a:ext cx="1800200" cy="1200329"/>
+          </a:xfrm>
+          <a:prstGeom prst="rect">
+            <a:avLst/>
+          </a:prstGeom>
+          <a:noFill/>
+        </p:spPr>
+        <p:txBody>
+          <a:bodyPr wrap="square" rtlCol="0">
+            <a:spAutoFit/>
+          </a:bodyPr>
+          <a:lstStyle/>
+          <a:p>
+            <a:r>
+              <a:rPr lang="ru-RU" dirty="0" smtClean="0"/>
+              <a:t>Кол-во графов с равновесиями</a:t>
+            </a:r>
+          </a:p>
+          <a:p>
+            <a:endParaRPr lang="ru-RU" dirty="0"/>
+          </a:p>
+        </p:txBody>
+      </p:sp>
     </p:spTree>
     <p:extLst>
       <p:ext uri="{BB962C8B-B14F-4D97-AF65-F5344CB8AC3E}">
-        <p14:creationId xmlns:p14="http://schemas.microsoft.com/office/powerpoint/2010/main" val="1990255387"/>
+        <p14:creationId xmlns:p14="http://schemas.microsoft.com/office/powerpoint/2010/main" val="112117566"/>
       </p:ext>
     </p:extLst>
   </p:cSld>
@@ -6874,8 +7033,8 @@
         </p:nvSpPr>
         <p:spPr>
           <a:xfrm>
-            <a:off x="251520" y="188640"/>
-            <a:ext cx="8568952" cy="1152128"/>
+            <a:off x="683568" y="116632"/>
+            <a:ext cx="7776864" cy="1368152"/>
           </a:xfrm>
         </p:spPr>
         <p:txBody>
@@ -6883,12 +7042,10 @@
           <a:lstStyle/>
           <a:p>
             <a:r>
-              <a:rPr lang="ru-RU" sz="2800" b="1" dirty="0">
-                <a:effectLst/>
-              </a:rPr>
-              <a:t>Зависимость числа таких равновесий от кол-ва равновесий в симметричных графах</a:t>
-            </a:r>
-            <a:endParaRPr lang="ru-RU" sz="2800" dirty="0"/>
+              <a:rPr lang="ru-RU" sz="3200" dirty="0" smtClean="0"/>
+              <a:t>Кол-во симметричных ребер в графах с равновесными разбиениями</a:t>
+            </a:r>
+            <a:endParaRPr lang="ru-RU" sz="3200" dirty="0"/>
           </a:p>
         </p:txBody>
       </p:sp>
@@ -6899,14 +7056,36 @@
           <p:nvPr>
             <p:extLst>
               <p:ext uri="{D42A27DB-BD31-4B8C-83A1-F6EECF244321}">
-                <p14:modId xmlns:p14="http://schemas.microsoft.com/office/powerpoint/2010/main" val="4115273306"/>
+                <p14:modId xmlns:p14="http://schemas.microsoft.com/office/powerpoint/2010/main" val="1581353856"/>
               </p:ext>
             </p:extLst>
           </p:nvPr>
         </p:nvGraphicFramePr>
         <p:xfrm>
-          <a:off x="0" y="2420888"/>
-          <a:ext cx="2778855" cy="3816424"/>
+          <a:off x="539552" y="1484784"/>
+          <a:ext cx="2088232" cy="2608064"/>
+        </p:xfrm>
+        <a:graphic>
+          <a:graphicData uri="http://schemas.openxmlformats.org/drawingml/2006/chart">
+            <c:chart xmlns:c="http://schemas.openxmlformats.org/drawingml/2006/chart" xmlns:r="http://schemas.openxmlformats.org/officeDocument/2006/relationships" r:id="rId2"/>
+          </a:graphicData>
+        </a:graphic>
+      </p:graphicFrame>
+      <p:graphicFrame>
+        <p:nvGraphicFramePr>
+          <p:cNvPr id="12" name="Диаграмма 11"/>
+          <p:cNvGraphicFramePr/>
+          <p:nvPr>
+            <p:extLst>
+              <p:ext uri="{D42A27DB-BD31-4B8C-83A1-F6EECF244321}">
+                <p14:modId xmlns:p14="http://schemas.microsoft.com/office/powerpoint/2010/main" val="3920075693"/>
+              </p:ext>
+            </p:extLst>
+          </p:nvPr>
+        </p:nvGraphicFramePr>
+        <p:xfrm>
+          <a:off x="539552" y="4157219"/>
+          <a:ext cx="2088232" cy="2608064"/>
         </p:xfrm>
         <a:graphic>
           <a:graphicData uri="http://schemas.openxmlformats.org/drawingml/2006/chart">
@@ -6916,19 +7095,19 @@
       </p:graphicFrame>
       <p:graphicFrame>
         <p:nvGraphicFramePr>
-          <p:cNvPr id="5" name="Диаграмма 4"/>
+          <p:cNvPr id="13" name="Диаграмма 12"/>
           <p:cNvGraphicFramePr/>
           <p:nvPr>
             <p:extLst>
               <p:ext uri="{D42A27DB-BD31-4B8C-83A1-F6EECF244321}">
-                <p14:modId xmlns:p14="http://schemas.microsoft.com/office/powerpoint/2010/main" val="942267563"/>
+                <p14:modId xmlns:p14="http://schemas.microsoft.com/office/powerpoint/2010/main" val="1956686003"/>
               </p:ext>
             </p:extLst>
           </p:nvPr>
         </p:nvGraphicFramePr>
         <p:xfrm>
-          <a:off x="2915816" y="2348880"/>
-          <a:ext cx="2808312" cy="3888432"/>
+          <a:off x="2555776" y="1556792"/>
+          <a:ext cx="3312368" cy="5301208"/>
         </p:xfrm>
         <a:graphic>
           <a:graphicData uri="http://schemas.openxmlformats.org/drawingml/2006/chart">
@@ -6938,19 +7117,19 @@
       </p:graphicFrame>
       <p:graphicFrame>
         <p:nvGraphicFramePr>
-          <p:cNvPr id="6" name="Диаграмма 5"/>
+          <p:cNvPr id="14" name="Диаграмма 13"/>
           <p:cNvGraphicFramePr/>
           <p:nvPr>
             <p:extLst>
               <p:ext uri="{D42A27DB-BD31-4B8C-83A1-F6EECF244321}">
-                <p14:modId xmlns:p14="http://schemas.microsoft.com/office/powerpoint/2010/main" val="3838435380"/>
+                <p14:modId xmlns:p14="http://schemas.microsoft.com/office/powerpoint/2010/main" val="3108317785"/>
               </p:ext>
             </p:extLst>
           </p:nvPr>
         </p:nvGraphicFramePr>
         <p:xfrm>
-          <a:off x="5810222" y="2420888"/>
-          <a:ext cx="3312368" cy="3816424"/>
+          <a:off x="5831632" y="1556792"/>
+          <a:ext cx="3312368" cy="5301208"/>
         </p:xfrm>
         <a:graphic>
           <a:graphicData uri="http://schemas.openxmlformats.org/drawingml/2006/chart">
@@ -6961,7 +7140,7 @@
     </p:spTree>
     <p:extLst>
       <p:ext uri="{BB962C8B-B14F-4D97-AF65-F5344CB8AC3E}">
-        <p14:creationId xmlns:p14="http://schemas.microsoft.com/office/powerpoint/2010/main" val="798292958"/>
+        <p14:creationId xmlns:p14="http://schemas.microsoft.com/office/powerpoint/2010/main" val="1990255387"/>
       </p:ext>
     </p:extLst>
   </p:cSld>
@@ -7027,41 +7206,19 @@
       </p:sp>
       <p:graphicFrame>
         <p:nvGraphicFramePr>
-          <p:cNvPr id="7" name="Диаграмма 6"/>
+          <p:cNvPr id="4" name="Диаграмма 3"/>
           <p:cNvGraphicFramePr/>
           <p:nvPr>
             <p:extLst>
               <p:ext uri="{D42A27DB-BD31-4B8C-83A1-F6EECF244321}">
-                <p14:modId xmlns:p14="http://schemas.microsoft.com/office/powerpoint/2010/main" val="1084957271"/>
+                <p14:modId xmlns:p14="http://schemas.microsoft.com/office/powerpoint/2010/main" val="4115273306"/>
               </p:ext>
             </p:extLst>
           </p:nvPr>
         </p:nvGraphicFramePr>
         <p:xfrm>
-          <a:off x="4355976" y="1556792"/>
-          <a:ext cx="4788024" cy="5301208"/>
-        </p:xfrm>
-        <a:graphic>
-          <a:graphicData uri="http://schemas.openxmlformats.org/drawingml/2006/chart">
-            <c:chart xmlns:c="http://schemas.openxmlformats.org/drawingml/2006/chart" xmlns:r="http://schemas.openxmlformats.org/officeDocument/2006/relationships" r:id="rId2"/>
-          </a:graphicData>
-        </a:graphic>
-      </p:graphicFrame>
-      <p:graphicFrame>
-        <p:nvGraphicFramePr>
-          <p:cNvPr id="8" name="Диаграмма 7"/>
-          <p:cNvGraphicFramePr/>
-          <p:nvPr>
-            <p:extLst>
-              <p:ext uri="{D42A27DB-BD31-4B8C-83A1-F6EECF244321}">
-                <p14:modId xmlns:p14="http://schemas.microsoft.com/office/powerpoint/2010/main" val="1232221228"/>
-              </p:ext>
-            </p:extLst>
-          </p:nvPr>
-        </p:nvGraphicFramePr>
-        <p:xfrm>
-          <a:off x="0" y="1588457"/>
-          <a:ext cx="4427984" cy="5301208"/>
+          <a:off x="0" y="2420888"/>
+          <a:ext cx="2778855" cy="3816424"/>
         </p:xfrm>
         <a:graphic>
           <a:graphicData uri="http://schemas.openxmlformats.org/drawingml/2006/chart">
@@ -7069,10 +7226,54 @@
           </a:graphicData>
         </a:graphic>
       </p:graphicFrame>
+      <p:graphicFrame>
+        <p:nvGraphicFramePr>
+          <p:cNvPr id="5" name="Диаграмма 4"/>
+          <p:cNvGraphicFramePr/>
+          <p:nvPr>
+            <p:extLst>
+              <p:ext uri="{D42A27DB-BD31-4B8C-83A1-F6EECF244321}">
+                <p14:modId xmlns:p14="http://schemas.microsoft.com/office/powerpoint/2010/main" val="942267563"/>
+              </p:ext>
+            </p:extLst>
+          </p:nvPr>
+        </p:nvGraphicFramePr>
+        <p:xfrm>
+          <a:off x="2915816" y="2348880"/>
+          <a:ext cx="2808312" cy="3888432"/>
+        </p:xfrm>
+        <a:graphic>
+          <a:graphicData uri="http://schemas.openxmlformats.org/drawingml/2006/chart">
+            <c:chart xmlns:c="http://schemas.openxmlformats.org/drawingml/2006/chart" xmlns:r="http://schemas.openxmlformats.org/officeDocument/2006/relationships" r:id="rId4"/>
+          </a:graphicData>
+        </a:graphic>
+      </p:graphicFrame>
+      <p:graphicFrame>
+        <p:nvGraphicFramePr>
+          <p:cNvPr id="6" name="Диаграмма 5"/>
+          <p:cNvGraphicFramePr/>
+          <p:nvPr>
+            <p:extLst>
+              <p:ext uri="{D42A27DB-BD31-4B8C-83A1-F6EECF244321}">
+                <p14:modId xmlns:p14="http://schemas.microsoft.com/office/powerpoint/2010/main" val="3838435380"/>
+              </p:ext>
+            </p:extLst>
+          </p:nvPr>
+        </p:nvGraphicFramePr>
+        <p:xfrm>
+          <a:off x="5810222" y="2420888"/>
+          <a:ext cx="3312368" cy="3816424"/>
+        </p:xfrm>
+        <a:graphic>
+          <a:graphicData uri="http://schemas.openxmlformats.org/drawingml/2006/chart">
+            <c:chart xmlns:c="http://schemas.openxmlformats.org/drawingml/2006/chart" xmlns:r="http://schemas.openxmlformats.org/officeDocument/2006/relationships" r:id="rId5"/>
+          </a:graphicData>
+        </a:graphic>
+      </p:graphicFrame>
     </p:spTree>
     <p:extLst>
       <p:ext uri="{BB962C8B-B14F-4D97-AF65-F5344CB8AC3E}">
-        <p14:creationId xmlns:p14="http://schemas.microsoft.com/office/powerpoint/2010/main" val="3778220832"/>
+        <p14:creationId xmlns:p14="http://schemas.microsoft.com/office/powerpoint/2010/main" val="798292958"/>
       </p:ext>
     </p:extLst>
   </p:cSld>
@@ -7108,6 +7309,117 @@
       </p:grpSpPr>
       <p:sp>
         <p:nvSpPr>
+          <p:cNvPr id="3" name="Заголовок 2"/>
+          <p:cNvSpPr>
+            <a:spLocks noGrp="1"/>
+          </p:cNvSpPr>
+          <p:nvPr>
+            <p:ph type="title"/>
+          </p:nvPr>
+        </p:nvSpPr>
+        <p:spPr>
+          <a:xfrm>
+            <a:off x="251520" y="188640"/>
+            <a:ext cx="8568952" cy="1152128"/>
+          </a:xfrm>
+        </p:spPr>
+        <p:txBody>
+          <a:bodyPr/>
+          <a:lstStyle/>
+          <a:p>
+            <a:r>
+              <a:rPr lang="ru-RU" sz="2800" b="1" dirty="0">
+                <a:effectLst/>
+              </a:rPr>
+              <a:t>Зависимость числа таких равновесий от кол-ва равновесий в симметричных графах</a:t>
+            </a:r>
+            <a:endParaRPr lang="ru-RU" sz="2800" dirty="0"/>
+          </a:p>
+        </p:txBody>
+      </p:sp>
+      <p:graphicFrame>
+        <p:nvGraphicFramePr>
+          <p:cNvPr id="7" name="Диаграмма 6"/>
+          <p:cNvGraphicFramePr/>
+          <p:nvPr>
+            <p:extLst>
+              <p:ext uri="{D42A27DB-BD31-4B8C-83A1-F6EECF244321}">
+                <p14:modId xmlns:p14="http://schemas.microsoft.com/office/powerpoint/2010/main" val="1084957271"/>
+              </p:ext>
+            </p:extLst>
+          </p:nvPr>
+        </p:nvGraphicFramePr>
+        <p:xfrm>
+          <a:off x="4355976" y="1556792"/>
+          <a:ext cx="4788024" cy="5301208"/>
+        </p:xfrm>
+        <a:graphic>
+          <a:graphicData uri="http://schemas.openxmlformats.org/drawingml/2006/chart">
+            <c:chart xmlns:c="http://schemas.openxmlformats.org/drawingml/2006/chart" xmlns:r="http://schemas.openxmlformats.org/officeDocument/2006/relationships" r:id="rId2"/>
+          </a:graphicData>
+        </a:graphic>
+      </p:graphicFrame>
+      <p:graphicFrame>
+        <p:nvGraphicFramePr>
+          <p:cNvPr id="8" name="Диаграмма 7"/>
+          <p:cNvGraphicFramePr/>
+          <p:nvPr>
+            <p:extLst>
+              <p:ext uri="{D42A27DB-BD31-4B8C-83A1-F6EECF244321}">
+                <p14:modId xmlns:p14="http://schemas.microsoft.com/office/powerpoint/2010/main" val="1232221228"/>
+              </p:ext>
+            </p:extLst>
+          </p:nvPr>
+        </p:nvGraphicFramePr>
+        <p:xfrm>
+          <a:off x="0" y="1588457"/>
+          <a:ext cx="4427984" cy="5301208"/>
+        </p:xfrm>
+        <a:graphic>
+          <a:graphicData uri="http://schemas.openxmlformats.org/drawingml/2006/chart">
+            <c:chart xmlns:c="http://schemas.openxmlformats.org/drawingml/2006/chart" xmlns:r="http://schemas.openxmlformats.org/officeDocument/2006/relationships" r:id="rId3"/>
+          </a:graphicData>
+        </a:graphic>
+      </p:graphicFrame>
+    </p:spTree>
+    <p:extLst>
+      <p:ext uri="{BB962C8B-B14F-4D97-AF65-F5344CB8AC3E}">
+        <p14:creationId xmlns:p14="http://schemas.microsoft.com/office/powerpoint/2010/main" val="3778220832"/>
+      </p:ext>
+    </p:extLst>
+  </p:cSld>
+  <p:clrMapOvr>
+    <a:masterClrMapping/>
+  </p:clrMapOvr>
+  <p:timing>
+    <p:tnLst>
+      <p:par>
+        <p:cTn id="1" dur="indefinite" restart="never" nodeType="tmRoot"/>
+      </p:par>
+    </p:tnLst>
+  </p:timing>
+</p:sld>
+</file>
+
+<file path=ppt/slides/slide14.xml><?xml version="1.0" encoding="utf-8"?>
+<p:sld xmlns:a="http://schemas.openxmlformats.org/drawingml/2006/main" xmlns:r="http://schemas.openxmlformats.org/officeDocument/2006/relationships" xmlns:p="http://schemas.openxmlformats.org/presentationml/2006/main">
+  <p:cSld>
+    <p:spTree>
+      <p:nvGrpSpPr>
+        <p:cNvPr id="1" name=""/>
+        <p:cNvGrpSpPr/>
+        <p:nvPr/>
+      </p:nvGrpSpPr>
+      <p:grpSpPr>
+        <a:xfrm>
+          <a:off x="0" y="0"/>
+          <a:ext cx="0" cy="0"/>
+          <a:chOff x="0" y="0"/>
+          <a:chExt cx="0" cy="0"/>
+        </a:xfrm>
+      </p:grpSpPr>
+      <p:sp>
+        <p:nvSpPr>
           <p:cNvPr id="2" name="Объект 1"/>
           <p:cNvSpPr>
             <a:spLocks noGrp="1"/>
@@ -7207,7 +7519,7 @@
 </p:sld>
 </file>
 
-<file path=ppt/slides/slide14.xml><?xml version="1.0" encoding="utf-8"?>
+<file path=ppt/slides/slide15.xml><?xml version="1.0" encoding="utf-8"?>
 <p:sld xmlns:a="http://schemas.openxmlformats.org/drawingml/2006/main" xmlns:r="http://schemas.openxmlformats.org/officeDocument/2006/relationships" xmlns:p="http://schemas.openxmlformats.org/presentationml/2006/main">
   <p:cSld>
     <p:spTree>
@@ -7443,6 +7755,279 @@
         </p:nvSpPr>
         <p:spPr>
           <a:xfrm>
+            <a:off x="179512" y="404664"/>
+            <a:ext cx="8773414" cy="648072"/>
+          </a:xfrm>
+        </p:spPr>
+        <p:txBody>
+          <a:bodyPr/>
+          <a:lstStyle/>
+          <a:p>
+            <a:r>
+              <a:rPr lang="ru-RU" sz="3200" dirty="0" smtClean="0"/>
+              <a:t>Что такое равновесная коалиция?</a:t>
+            </a:r>
+            <a:endParaRPr lang="ru-RU" sz="3200" dirty="0"/>
+          </a:p>
+        </p:txBody>
+      </p:sp>
+      <p:pic>
+        <p:nvPicPr>
+          <p:cNvPr id="1026" name="Picture 2"/>
+          <p:cNvPicPr>
+            <a:picLocks noChangeAspect="1" noChangeArrowheads="1"/>
+          </p:cNvPicPr>
+          <p:nvPr/>
+        </p:nvPicPr>
+        <p:blipFill rotWithShape="1">
+          <a:blip r:embed="rId2">
+            <a:extLst>
+              <a:ext uri="{28A0092B-C50C-407E-A947-70E740481C1C}">
+                <a14:useLocalDpi xmlns:a14="http://schemas.microsoft.com/office/drawing/2010/main" val="0"/>
+              </a:ext>
+            </a:extLst>
+          </a:blip>
+          <a:srcRect l="44844" t="26786" r="22024" b="13691"/>
+          <a:stretch/>
+        </p:blipFill>
+        <p:spPr bwMode="auto">
+          <a:xfrm>
+            <a:off x="827584" y="1192539"/>
+            <a:ext cx="2427961" cy="2452486"/>
+          </a:xfrm>
+          <a:prstGeom prst="rect">
+            <a:avLst/>
+          </a:prstGeom>
+          <a:noFill/>
+          <a:ln>
+            <a:noFill/>
+          </a:ln>
+          <a:extLst>
+            <a:ext uri="{909E8E84-426E-40DD-AFC4-6F175D3DCCD1}">
+              <a14:hiddenFill xmlns:a14="http://schemas.microsoft.com/office/drawing/2010/main">
+                <a:solidFill>
+                  <a:schemeClr val="accent1"/>
+                </a:solidFill>
+              </a14:hiddenFill>
+            </a:ext>
+            <a:ext uri="{91240B29-F687-4F45-9708-019B960494DF}">
+              <a14:hiddenLine xmlns:a14="http://schemas.microsoft.com/office/drawing/2010/main" w="9525">
+                <a:solidFill>
+                  <a:schemeClr val="tx1"/>
+                </a:solidFill>
+                <a:miter lim="800000"/>
+                <a:headEnd/>
+                <a:tailEnd/>
+              </a14:hiddenLine>
+            </a:ext>
+          </a:extLst>
+        </p:spPr>
+      </p:pic>
+      <p:pic>
+        <p:nvPicPr>
+          <p:cNvPr id="1027" name="Picture 3"/>
+          <p:cNvPicPr>
+            <a:picLocks noChangeAspect="1" noChangeArrowheads="1"/>
+          </p:cNvPicPr>
+          <p:nvPr/>
+        </p:nvPicPr>
+        <p:blipFill rotWithShape="1">
+          <a:blip r:embed="rId3">
+            <a:extLst>
+              <a:ext uri="{28A0092B-C50C-407E-A947-70E740481C1C}">
+                <a14:useLocalDpi xmlns:a14="http://schemas.microsoft.com/office/drawing/2010/main" val="0"/>
+              </a:ext>
+            </a:extLst>
+          </a:blip>
+          <a:srcRect l="45314" t="30109" r="22224" b="14931"/>
+          <a:stretch/>
+        </p:blipFill>
+        <p:spPr bwMode="auto">
+          <a:xfrm>
+            <a:off x="5477447" y="1192539"/>
+            <a:ext cx="2571442" cy="2447730"/>
+          </a:xfrm>
+          <a:prstGeom prst="rect">
+            <a:avLst/>
+          </a:prstGeom>
+          <a:noFill/>
+          <a:ln>
+            <a:noFill/>
+          </a:ln>
+          <a:extLst>
+            <a:ext uri="{909E8E84-426E-40DD-AFC4-6F175D3DCCD1}">
+              <a14:hiddenFill xmlns:a14="http://schemas.microsoft.com/office/drawing/2010/main">
+                <a:solidFill>
+                  <a:schemeClr val="accent1"/>
+                </a:solidFill>
+              </a14:hiddenFill>
+            </a:ext>
+            <a:ext uri="{91240B29-F687-4F45-9708-019B960494DF}">
+              <a14:hiddenLine xmlns:a14="http://schemas.microsoft.com/office/drawing/2010/main" w="9525">
+                <a:solidFill>
+                  <a:schemeClr val="tx1"/>
+                </a:solidFill>
+                <a:miter lim="800000"/>
+                <a:headEnd/>
+                <a:tailEnd/>
+              </a14:hiddenLine>
+            </a:ext>
+          </a:extLst>
+        </p:spPr>
+      </p:pic>
+      <p:pic>
+        <p:nvPicPr>
+          <p:cNvPr id="1028" name="Picture 4"/>
+          <p:cNvPicPr>
+            <a:picLocks noChangeAspect="1" noChangeArrowheads="1"/>
+          </p:cNvPicPr>
+          <p:nvPr/>
+        </p:nvPicPr>
+        <p:blipFill rotWithShape="1">
+          <a:blip r:embed="rId4">
+            <a:extLst>
+              <a:ext uri="{28A0092B-C50C-407E-A947-70E740481C1C}">
+                <a14:useLocalDpi xmlns:a14="http://schemas.microsoft.com/office/drawing/2010/main" val="0"/>
+              </a:ext>
+            </a:extLst>
+          </a:blip>
+          <a:srcRect l="44199" t="29910" r="27233" b="16716"/>
+          <a:stretch/>
+        </p:blipFill>
+        <p:spPr bwMode="auto">
+          <a:xfrm>
+            <a:off x="827584" y="4035156"/>
+            <a:ext cx="2427961" cy="2550321"/>
+          </a:xfrm>
+          <a:prstGeom prst="rect">
+            <a:avLst/>
+          </a:prstGeom>
+          <a:noFill/>
+          <a:ln>
+            <a:noFill/>
+          </a:ln>
+          <a:extLst>
+            <a:ext uri="{909E8E84-426E-40DD-AFC4-6F175D3DCCD1}">
+              <a14:hiddenFill xmlns:a14="http://schemas.microsoft.com/office/drawing/2010/main">
+                <a:solidFill>
+                  <a:schemeClr val="accent1"/>
+                </a:solidFill>
+              </a14:hiddenFill>
+            </a:ext>
+            <a:ext uri="{91240B29-F687-4F45-9708-019B960494DF}">
+              <a14:hiddenLine xmlns:a14="http://schemas.microsoft.com/office/drawing/2010/main" w="9525">
+                <a:solidFill>
+                  <a:schemeClr val="tx1"/>
+                </a:solidFill>
+                <a:miter lim="800000"/>
+                <a:headEnd/>
+                <a:tailEnd/>
+              </a14:hiddenLine>
+            </a:ext>
+          </a:extLst>
+        </p:spPr>
+      </p:pic>
+      <p:pic>
+        <p:nvPicPr>
+          <p:cNvPr id="1029" name="Picture 5"/>
+          <p:cNvPicPr>
+            <a:picLocks noChangeAspect="1" noChangeArrowheads="1"/>
+          </p:cNvPicPr>
+          <p:nvPr/>
+        </p:nvPicPr>
+        <p:blipFill rotWithShape="1">
+          <a:blip r:embed="rId5">
+            <a:extLst>
+              <a:ext uri="{28A0092B-C50C-407E-A947-70E740481C1C}">
+                <a14:useLocalDpi xmlns:a14="http://schemas.microsoft.com/office/drawing/2010/main" val="0"/>
+              </a:ext>
+            </a:extLst>
+          </a:blip>
+          <a:srcRect l="44757" t="31696" r="25905" b="16121"/>
+          <a:stretch/>
+        </p:blipFill>
+        <p:spPr bwMode="auto">
+          <a:xfrm>
+            <a:off x="5498568" y="4035156"/>
+            <a:ext cx="2550321" cy="2550321"/>
+          </a:xfrm>
+          <a:prstGeom prst="rect">
+            <a:avLst/>
+          </a:prstGeom>
+          <a:noFill/>
+          <a:ln>
+            <a:noFill/>
+          </a:ln>
+          <a:extLst>
+            <a:ext uri="{909E8E84-426E-40DD-AFC4-6F175D3DCCD1}">
+              <a14:hiddenFill xmlns:a14="http://schemas.microsoft.com/office/drawing/2010/main">
+                <a:solidFill>
+                  <a:schemeClr val="accent1"/>
+                </a:solidFill>
+              </a14:hiddenFill>
+            </a:ext>
+            <a:ext uri="{91240B29-F687-4F45-9708-019B960494DF}">
+              <a14:hiddenLine xmlns:a14="http://schemas.microsoft.com/office/drawing/2010/main" w="9525">
+                <a:solidFill>
+                  <a:schemeClr val="tx1"/>
+                </a:solidFill>
+                <a:miter lim="800000"/>
+                <a:headEnd/>
+                <a:tailEnd/>
+              </a14:hiddenLine>
+            </a:ext>
+          </a:extLst>
+        </p:spPr>
+      </p:pic>
+    </p:spTree>
+    <p:extLst>
+      <p:ext uri="{BB962C8B-B14F-4D97-AF65-F5344CB8AC3E}">
+        <p14:creationId xmlns:p14="http://schemas.microsoft.com/office/powerpoint/2010/main" val="867445361"/>
+      </p:ext>
+    </p:extLst>
+  </p:cSld>
+  <p:clrMapOvr>
+    <a:masterClrMapping/>
+  </p:clrMapOvr>
+  <p:timing>
+    <p:tnLst>
+      <p:par>
+        <p:cTn id="1" dur="indefinite" restart="never" nodeType="tmRoot"/>
+      </p:par>
+    </p:tnLst>
+  </p:timing>
+</p:sld>
+</file>
+
+<file path=ppt/slides/slide3.xml><?xml version="1.0" encoding="utf-8"?>
+<p:sld xmlns:a="http://schemas.openxmlformats.org/drawingml/2006/main" xmlns:r="http://schemas.openxmlformats.org/officeDocument/2006/relationships" xmlns:p="http://schemas.openxmlformats.org/presentationml/2006/main">
+  <p:cSld>
+    <p:spTree>
+      <p:nvGrpSpPr>
+        <p:cNvPr id="1" name=""/>
+        <p:cNvGrpSpPr/>
+        <p:nvPr/>
+      </p:nvGrpSpPr>
+      <p:grpSpPr>
+        <a:xfrm>
+          <a:off x="0" y="0"/>
+          <a:ext cx="0" cy="0"/>
+          <a:chOff x="0" y="0"/>
+          <a:chExt cx="0" cy="0"/>
+        </a:xfrm>
+      </p:grpSpPr>
+      <p:sp>
+        <p:nvSpPr>
+          <p:cNvPr id="3" name="Заголовок 2"/>
+          <p:cNvSpPr>
+            <a:spLocks noGrp="1"/>
+          </p:cNvSpPr>
+          <p:nvPr>
+            <p:ph type="title"/>
+          </p:nvPr>
+        </p:nvSpPr>
+        <p:spPr>
+          <a:xfrm>
             <a:off x="395536" y="188640"/>
             <a:ext cx="8352928" cy="864096"/>
           </a:xfrm>
@@ -7470,7 +8055,7 @@
         <p:spPr>
           <a:xfrm>
             <a:off x="395536" y="1268760"/>
-            <a:ext cx="8640960" cy="2448272"/>
+            <a:ext cx="8640960" cy="2088232"/>
           </a:xfrm>
           <a:prstGeom prst="rect">
             <a:avLst/>
@@ -7694,70 +8279,45 @@
           </a:lstStyle>
           <a:p>
             <a:pPr marL="18288" indent="0">
-              <a:buFont typeface="Wingdings" pitchFamily="2" charset="2"/>
               <a:buNone/>
             </a:pPr>
             <a:r>
-              <a:rPr lang="en-US" dirty="0" smtClean="0"/>
-              <a:t>A Landscape Theory of Aggregation</a:t>
-            </a:r>
-            <a:r>
-              <a:rPr lang="ru-RU" dirty="0" smtClean="0"/>
-              <a:t>, описанная в 1993 году Робертом </a:t>
-            </a:r>
-            <a:r>
-              <a:rPr lang="ru-RU" dirty="0" err="1" smtClean="0"/>
-              <a:t>Аксельродом</a:t>
-            </a:r>
-            <a:r>
-              <a:rPr lang="ru-RU" dirty="0" smtClean="0"/>
-              <a:t> и Скоттом </a:t>
-            </a:r>
-            <a:r>
-              <a:rPr lang="ru-RU" dirty="0" err="1" smtClean="0"/>
-              <a:t>Беннеттом</a:t>
-            </a:r>
-            <a:r>
-              <a:rPr lang="ru-RU" dirty="0" smtClean="0"/>
+              <a:rPr lang="ru-RU" sz="2400" dirty="0" smtClean="0"/>
+              <a:t>Равновесное </a:t>
+            </a:r>
+            <a:r>
+              <a:rPr lang="ru-RU" sz="2400" dirty="0"/>
+              <a:t>разбиение (конфигурация) – это такое разбиение, когда никому из игроков</a:t>
+            </a:r>
+            <a:r>
+              <a:rPr lang="en-US" sz="2400" dirty="0"/>
+              <a:t> (</a:t>
+            </a:r>
+            <a:r>
+              <a:rPr lang="ru-RU" sz="2400" dirty="0"/>
+              <a:t>вершин графа) не выгодно менять </a:t>
+            </a:r>
+            <a:r>
+              <a:rPr lang="ru-RU" sz="2400" dirty="0" smtClean="0"/>
+              <a:t>коалиции</a:t>
+            </a:r>
+            <a:r>
+              <a:rPr lang="en-US" sz="2400" dirty="0"/>
+              <a:t>,</a:t>
+            </a:r>
+            <a:r>
+              <a:rPr lang="ru-RU" sz="2400" dirty="0" smtClean="0"/>
+              <a:t> </a:t>
+            </a:r>
+            <a:r>
+              <a:rPr lang="ru-RU" sz="2400" dirty="0"/>
+              <a:t>при условии, что больше никто этого не сделает</a:t>
+            </a:r>
+            <a:r>
+              <a:rPr lang="ru-RU" sz="2400" dirty="0" smtClean="0"/>
               <a:t>.</a:t>
             </a:r>
-          </a:p>
-          <a:p>
-            <a:pPr marL="18288" indent="0">
-              <a:buFont typeface="Wingdings" pitchFamily="2" charset="2"/>
-              <a:buNone/>
-            </a:pPr>
-            <a:r>
-              <a:rPr lang="ru-RU" dirty="0" smtClean="0"/>
-              <a:t>Основные термины:</a:t>
-            </a:r>
-          </a:p>
-          <a:p>
-            <a:pPr>
-              <a:buFont typeface="Wingdings" pitchFamily="2" charset="2"/>
-              <a:buChar char="v"/>
-            </a:pPr>
-            <a:r>
-              <a:rPr lang="ru-RU" dirty="0"/>
-              <a:t>Р</a:t>
-            </a:r>
-            <a:r>
-              <a:rPr lang="ru-RU" dirty="0" smtClean="0"/>
-              <a:t>авновесное </a:t>
-            </a:r>
-            <a:r>
-              <a:rPr lang="ru-RU" dirty="0"/>
-              <a:t>разбиение (конфигурация) – это такое разбиение, когда никому из игроков</a:t>
-            </a:r>
-            <a:r>
-              <a:rPr lang="en-US" dirty="0"/>
-              <a:t> (</a:t>
-            </a:r>
-            <a:r>
-              <a:rPr lang="ru-RU" dirty="0"/>
-              <a:t>вершин графа) не выгодно менять коалиции при условии, что больше никто этого не сделает.</a:t>
-            </a:r>
-            <a:endParaRPr lang="ru-RU" dirty="0" smtClean="0"/>
+            <a:endParaRPr lang="ru-RU" sz="2400" dirty="0" smtClean="0"/>
           </a:p>
         </p:txBody>
       </p:sp>
@@ -7782,8 +8342,8 @@
         </p:blipFill>
         <p:spPr bwMode="auto">
           <a:xfrm>
-            <a:off x="2874526" y="3573016"/>
-            <a:ext cx="3682979" cy="3284984"/>
+            <a:off x="3301504" y="2780928"/>
+            <a:ext cx="4361770" cy="3890423"/>
           </a:xfrm>
           <a:prstGeom prst="rect">
             <a:avLst/>
@@ -7833,182 +8393,6 @@
 </p:sld>
 </file>
 
-<file path=ppt/slides/slide3.xml><?xml version="1.0" encoding="utf-8"?>
-<p:sld xmlns:a="http://schemas.openxmlformats.org/drawingml/2006/main" xmlns:r="http://schemas.openxmlformats.org/officeDocument/2006/relationships" xmlns:p="http://schemas.openxmlformats.org/presentationml/2006/main">
-  <p:cSld>
-    <p:spTree>
-      <p:nvGrpSpPr>
-        <p:cNvPr id="1" name=""/>
-        <p:cNvGrpSpPr/>
-        <p:nvPr/>
-      </p:nvGrpSpPr>
-      <p:grpSpPr>
-        <a:xfrm>
-          <a:off x="0" y="0"/>
-          <a:ext cx="0" cy="0"/>
-          <a:chOff x="0" y="0"/>
-          <a:chExt cx="0" cy="0"/>
-        </a:xfrm>
-      </p:grpSpPr>
-      <p:sp>
-        <p:nvSpPr>
-          <p:cNvPr id="2" name="Объект 1"/>
-          <p:cNvSpPr>
-            <a:spLocks noGrp="1"/>
-          </p:cNvSpPr>
-          <p:nvPr>
-            <p:ph idx="1"/>
-          </p:nvPr>
-        </p:nvSpPr>
-        <p:spPr>
-          <a:xfrm>
-            <a:off x="667656" y="1672772"/>
-            <a:ext cx="7792775" cy="4564540"/>
-          </a:xfrm>
-        </p:spPr>
-        <p:txBody>
-          <a:bodyPr>
-            <a:noAutofit/>
-          </a:bodyPr>
-          <a:lstStyle/>
-          <a:p>
-            <a:pPr marL="18288" indent="0">
-              <a:buNone/>
-            </a:pPr>
-            <a:r>
-              <a:rPr lang="ru-RU" sz="2400" dirty="0" smtClean="0"/>
-              <a:t>Применение:</a:t>
-            </a:r>
-          </a:p>
-          <a:p>
-            <a:pPr>
-              <a:buFont typeface="Wingdings" panose="05000000000000000000" pitchFamily="2" charset="2"/>
-              <a:buChar char="v"/>
-            </a:pPr>
-            <a:r>
-              <a:rPr lang="ru-RU" sz="2400" dirty="0" smtClean="0"/>
-              <a:t>Предсказании разбиения стран или компаний на союзы и альянсы</a:t>
-            </a:r>
-          </a:p>
-          <a:p>
-            <a:pPr>
-              <a:buFont typeface="Wingdings" panose="05000000000000000000" pitchFamily="2" charset="2"/>
-              <a:buChar char="v"/>
-            </a:pPr>
-            <a:r>
-              <a:rPr lang="ru-RU" sz="2400" dirty="0">
-                <a:effectLst/>
-              </a:rPr>
-              <a:t>П</a:t>
-            </a:r>
-            <a:r>
-              <a:rPr lang="ru-RU" sz="2400" dirty="0" smtClean="0">
-                <a:effectLst/>
-              </a:rPr>
-              <a:t>роектировании </a:t>
-            </a:r>
-            <a:r>
-              <a:rPr lang="ru-RU" sz="2400" dirty="0">
-                <a:effectLst/>
-              </a:rPr>
-              <a:t>топологии локальной </a:t>
-            </a:r>
-            <a:r>
-              <a:rPr lang="ru-RU" sz="2400" dirty="0" smtClean="0">
-                <a:effectLst/>
-              </a:rPr>
-              <a:t>сети, где</a:t>
-            </a:r>
-            <a:r>
-              <a:rPr lang="ru-RU" sz="2400" dirty="0">
-                <a:effectLst/>
-              </a:rPr>
-              <a:t> её разбиение на широковещательные домены определяется требованиями </a:t>
-            </a:r>
-            <a:r>
-              <a:rPr lang="ru-RU" sz="2400" dirty="0" smtClean="0">
-                <a:effectLst/>
-              </a:rPr>
-              <a:t>производительности</a:t>
-            </a:r>
-          </a:p>
-          <a:p>
-            <a:pPr>
-              <a:buFont typeface="Wingdings" panose="05000000000000000000" pitchFamily="2" charset="2"/>
-              <a:buChar char="v"/>
-            </a:pPr>
-            <a:r>
-              <a:rPr lang="ru-RU" sz="2400" dirty="0" smtClean="0">
-                <a:effectLst/>
-              </a:rPr>
-              <a:t>Разбиение любых других структур, которых можно представить в виде графа</a:t>
-            </a:r>
-          </a:p>
-          <a:p>
-            <a:pPr marL="18288" indent="0">
-              <a:buNone/>
-            </a:pPr>
-            <a:endParaRPr lang="ru-RU" sz="2400" dirty="0"/>
-          </a:p>
-          <a:p>
-            <a:pPr marL="18288" indent="0">
-              <a:buNone/>
-            </a:pPr>
-            <a:r>
-              <a:rPr lang="ru-RU" sz="2400" dirty="0" smtClean="0"/>
-              <a:t>На текущий момент нету программной реализации этого алгоритма.</a:t>
-            </a:r>
-          </a:p>
-        </p:txBody>
-      </p:sp>
-      <p:sp>
-        <p:nvSpPr>
-          <p:cNvPr id="3" name="Заголовок 2"/>
-          <p:cNvSpPr>
-            <a:spLocks noGrp="1"/>
-          </p:cNvSpPr>
-          <p:nvPr>
-            <p:ph type="title"/>
-          </p:nvPr>
-        </p:nvSpPr>
-        <p:spPr>
-          <a:xfrm>
-            <a:off x="683568" y="404664"/>
-            <a:ext cx="7776864" cy="914400"/>
-          </a:xfrm>
-        </p:spPr>
-        <p:txBody>
-          <a:bodyPr/>
-          <a:lstStyle/>
-          <a:p>
-            <a:r>
-              <a:rPr lang="ru-RU" dirty="0" smtClean="0"/>
-              <a:t>Актуальность</a:t>
-            </a:r>
-            <a:endParaRPr lang="ru-RU" dirty="0"/>
-          </a:p>
-        </p:txBody>
-      </p:sp>
-    </p:spTree>
-    <p:extLst>
-      <p:ext uri="{BB962C8B-B14F-4D97-AF65-F5344CB8AC3E}">
-        <p14:creationId xmlns:p14="http://schemas.microsoft.com/office/powerpoint/2010/main" val="2342479195"/>
-      </p:ext>
-    </p:extLst>
-  </p:cSld>
-  <p:clrMapOvr>
-    <a:masterClrMapping/>
-  </p:clrMapOvr>
-  <p:timing>
-    <p:tnLst>
-      <p:par>
-        <p:cTn id="1" dur="indefinite" restart="never" nodeType="tmRoot"/>
-      </p:par>
-    </p:tnLst>
-  </p:timing>
-</p:sld>
-</file>
-
 <file path=ppt/slides/slide4.xml><?xml version="1.0" encoding="utf-8"?>
 <p:sld xmlns:a="http://schemas.openxmlformats.org/drawingml/2006/main" xmlns:r="http://schemas.openxmlformats.org/officeDocument/2006/relationships" xmlns:p="http://schemas.openxmlformats.org/presentationml/2006/main">
   <p:cSld>
@@ -8038,23 +8422,32 @@
         </p:nvSpPr>
         <p:spPr>
           <a:xfrm>
-            <a:off x="667656" y="1672772"/>
-            <a:ext cx="7792775" cy="4564540"/>
+            <a:off x="179512" y="1412776"/>
+            <a:ext cx="8784976" cy="4824536"/>
           </a:xfrm>
         </p:spPr>
         <p:txBody>
           <a:bodyPr>
-            <a:normAutofit/>
+            <a:noAutofit/>
           </a:bodyPr>
           <a:lstStyle/>
+          <a:p>
+            <a:pPr marL="18288" indent="0">
+              <a:buNone/>
+            </a:pPr>
+            <a:r>
+              <a:rPr lang="ru-RU" sz="2400" dirty="0" smtClean="0"/>
+              <a:t>Применение:</a:t>
+            </a:r>
+          </a:p>
           <a:p>
             <a:pPr>
               <a:buFont typeface="Wingdings" panose="05000000000000000000" pitchFamily="2" charset="2"/>
               <a:buChar char="v"/>
             </a:pPr>
             <a:r>
-              <a:rPr lang="ru-RU" sz="2600" dirty="0" smtClean="0"/>
-              <a:t>Изучить необходимую литературу</a:t>
+              <a:rPr lang="ru-RU" sz="2400" dirty="0" smtClean="0"/>
+              <a:t>Предсказание объединения стран или компаний в устойчивые союзы</a:t>
             </a:r>
           </a:p>
           <a:p>
@@ -8063,8 +8456,64 @@
               <a:buChar char="v"/>
             </a:pPr>
             <a:r>
-              <a:rPr lang="ru-RU" sz="2600" dirty="0" smtClean="0"/>
-              <a:t>Создать векторизованный алгоритм генерации графов с заданными свойствами</a:t>
+              <a:rPr lang="ru-RU" sz="2400" dirty="0">
+                <a:effectLst/>
+              </a:rPr>
+              <a:t>П</a:t>
+            </a:r>
+            <a:r>
+              <a:rPr lang="ru-RU" sz="2400" dirty="0" smtClean="0">
+                <a:effectLst/>
+              </a:rPr>
+              <a:t>роектировании </a:t>
+            </a:r>
+            <a:r>
+              <a:rPr lang="ru-RU" sz="2400" dirty="0">
+                <a:effectLst/>
+              </a:rPr>
+              <a:t>топологии локальной </a:t>
+            </a:r>
+            <a:r>
+              <a:rPr lang="ru-RU" sz="2400" dirty="0" smtClean="0">
+                <a:effectLst/>
+              </a:rPr>
+              <a:t>сети, где</a:t>
+            </a:r>
+            <a:r>
+              <a:rPr lang="ru-RU" sz="2400" dirty="0">
+                <a:effectLst/>
+              </a:rPr>
+              <a:t> её разбиение на </a:t>
+            </a:r>
+            <a:r>
+              <a:rPr lang="ru-RU" sz="2400" dirty="0" smtClean="0">
+                <a:effectLst/>
+              </a:rPr>
+              <a:t>широковещательные  домены</a:t>
+            </a:r>
+            <a:r>
+              <a:rPr lang="ru-RU" sz="2400" dirty="0">
+                <a:effectLst/>
+              </a:rPr>
+              <a:t> </a:t>
+            </a:r>
+            <a:r>
+              <a:rPr lang="ru-RU" sz="2400" dirty="0" smtClean="0">
+                <a:effectLst/>
+              </a:rPr>
+              <a:t>определяется </a:t>
+            </a:r>
+            <a:r>
+              <a:rPr lang="ru-RU" sz="2400" dirty="0">
+                <a:effectLst/>
+              </a:rPr>
+              <a:t>требованиями </a:t>
+            </a:r>
+            <a:r>
+              <a:rPr lang="ru-RU" sz="2400" dirty="0" smtClean="0">
+                <a:effectLst/>
+              </a:rPr>
+              <a:t>производительности</a:t>
             </a:r>
           </a:p>
           <a:p>
@@ -8073,28 +8522,25 @@
               <a:buChar char="v"/>
             </a:pPr>
             <a:r>
-              <a:rPr lang="ru-RU" sz="2600" dirty="0" smtClean="0"/>
-              <a:t>Создать алгоритм поиска равновесий в графе</a:t>
-            </a:r>
-          </a:p>
-          <a:p>
-            <a:pPr>
-              <a:buFont typeface="Wingdings" panose="05000000000000000000" pitchFamily="2" charset="2"/>
-              <a:buChar char="v"/>
+              <a:rPr lang="ru-RU" sz="2400" dirty="0" smtClean="0">
+                <a:effectLst/>
+              </a:rPr>
+              <a:t>Разбиение любых других структур, которых можно представить в виде графа</a:t>
+            </a:r>
+          </a:p>
+          <a:p>
+            <a:pPr marL="18288" indent="0">
+              <a:buNone/>
             </a:pPr>
-            <a:r>
-              <a:rPr lang="ru-RU" sz="2600" dirty="0" smtClean="0"/>
-              <a:t>Классифицировать графы с малым числом вершин по определенным свойствам</a:t>
-            </a:r>
-          </a:p>
-          <a:p>
-            <a:pPr>
-              <a:buFont typeface="Wingdings" panose="05000000000000000000" pitchFamily="2" charset="2"/>
-              <a:buChar char="v"/>
+            <a:endParaRPr lang="ru-RU" sz="2400" dirty="0"/>
+          </a:p>
+          <a:p>
+            <a:pPr marL="18288" indent="0">
+              <a:buNone/>
             </a:pPr>
             <a:r>
-              <a:rPr lang="ru-RU" sz="2600" dirty="0" smtClean="0"/>
-              <a:t>Исследовать влияние шума на равновесия в графе</a:t>
+              <a:rPr lang="ru-RU" sz="2400" dirty="0" smtClean="0"/>
+              <a:t>На текущий момент нет программной реализации этого алгоритма.</a:t>
             </a:r>
           </a:p>
         </p:txBody>
@@ -8121,7 +8567,7 @@
           <a:p>
             <a:r>
               <a:rPr lang="ru-RU" dirty="0" smtClean="0"/>
-              <a:t>Техническое задание</a:t>
+              <a:t>Актуальность</a:t>
             </a:r>
             <a:endParaRPr lang="ru-RU" dirty="0"/>
           </a:p>
@@ -8130,7 +8576,7 @@
     </p:spTree>
     <p:extLst>
       <p:ext uri="{BB962C8B-B14F-4D97-AF65-F5344CB8AC3E}">
-        <p14:creationId xmlns:p14="http://schemas.microsoft.com/office/powerpoint/2010/main" val="2733292878"/>
+        <p14:creationId xmlns:p14="http://schemas.microsoft.com/office/powerpoint/2010/main" val="2342479195"/>
       </p:ext>
     </p:extLst>
   </p:cSld>
@@ -8176,6 +8622,134 @@
         </p:nvSpPr>
         <p:spPr>
           <a:xfrm>
+            <a:off x="667656" y="1672772"/>
+            <a:ext cx="7792775" cy="4564540"/>
+          </a:xfrm>
+        </p:spPr>
+        <p:txBody>
+          <a:bodyPr>
+            <a:normAutofit/>
+          </a:bodyPr>
+          <a:lstStyle/>
+          <a:p>
+            <a:pPr>
+              <a:buFont typeface="Wingdings" panose="05000000000000000000" pitchFamily="2" charset="2"/>
+              <a:buChar char="v"/>
+            </a:pPr>
+            <a:r>
+              <a:rPr lang="ru-RU" sz="2600" dirty="0" smtClean="0"/>
+              <a:t>Изучить необходимую литературу</a:t>
+            </a:r>
+          </a:p>
+          <a:p>
+            <a:pPr>
+              <a:buFont typeface="Wingdings" panose="05000000000000000000" pitchFamily="2" charset="2"/>
+              <a:buChar char="v"/>
+            </a:pPr>
+            <a:r>
+              <a:rPr lang="ru-RU" sz="2600" dirty="0" smtClean="0"/>
+              <a:t>Создать алгоритм генерации графов с определенными заданными свойствами</a:t>
+            </a:r>
+          </a:p>
+          <a:p>
+            <a:pPr>
+              <a:buFont typeface="Wingdings" panose="05000000000000000000" pitchFamily="2" charset="2"/>
+              <a:buChar char="v"/>
+            </a:pPr>
+            <a:r>
+              <a:rPr lang="ru-RU" sz="2600" dirty="0" smtClean="0"/>
+              <a:t>Создать алгоритм поиска равновесий в графе</a:t>
+            </a:r>
+          </a:p>
+          <a:p>
+            <a:pPr>
+              <a:buFont typeface="Wingdings" panose="05000000000000000000" pitchFamily="2" charset="2"/>
+              <a:buChar char="v"/>
+            </a:pPr>
+            <a:r>
+              <a:rPr lang="ru-RU" sz="2600" dirty="0" smtClean="0"/>
+              <a:t>Провести эксперименты на графах с малым кол-вом вершин</a:t>
+            </a:r>
+          </a:p>
+        </p:txBody>
+      </p:sp>
+      <p:sp>
+        <p:nvSpPr>
+          <p:cNvPr id="3" name="Заголовок 2"/>
+          <p:cNvSpPr>
+            <a:spLocks noGrp="1"/>
+          </p:cNvSpPr>
+          <p:nvPr>
+            <p:ph type="title"/>
+          </p:nvPr>
+        </p:nvSpPr>
+        <p:spPr>
+          <a:xfrm>
+            <a:off x="683568" y="404664"/>
+            <a:ext cx="7776864" cy="914400"/>
+          </a:xfrm>
+        </p:spPr>
+        <p:txBody>
+          <a:bodyPr/>
+          <a:lstStyle/>
+          <a:p>
+            <a:r>
+              <a:rPr lang="ru-RU" dirty="0" smtClean="0"/>
+              <a:t>Техническое задание</a:t>
+            </a:r>
+            <a:endParaRPr lang="ru-RU" dirty="0"/>
+          </a:p>
+        </p:txBody>
+      </p:sp>
+    </p:spTree>
+    <p:extLst>
+      <p:ext uri="{BB962C8B-B14F-4D97-AF65-F5344CB8AC3E}">
+        <p14:creationId xmlns:p14="http://schemas.microsoft.com/office/powerpoint/2010/main" val="2733292878"/>
+      </p:ext>
+    </p:extLst>
+  </p:cSld>
+  <p:clrMapOvr>
+    <a:masterClrMapping/>
+  </p:clrMapOvr>
+  <p:timing>
+    <p:tnLst>
+      <p:par>
+        <p:cTn id="1" dur="indefinite" restart="never" nodeType="tmRoot"/>
+      </p:par>
+    </p:tnLst>
+  </p:timing>
+</p:sld>
+</file>
+
+<file path=ppt/slides/slide6.xml><?xml version="1.0" encoding="utf-8"?>
+<p:sld xmlns:a="http://schemas.openxmlformats.org/drawingml/2006/main" xmlns:r="http://schemas.openxmlformats.org/officeDocument/2006/relationships" xmlns:p="http://schemas.openxmlformats.org/presentationml/2006/main">
+  <p:cSld>
+    <p:spTree>
+      <p:nvGrpSpPr>
+        <p:cNvPr id="1" name=""/>
+        <p:cNvGrpSpPr/>
+        <p:nvPr/>
+      </p:nvGrpSpPr>
+      <p:grpSpPr>
+        <a:xfrm>
+          <a:off x="0" y="0"/>
+          <a:ext cx="0" cy="0"/>
+          <a:chOff x="0" y="0"/>
+          <a:chExt cx="0" cy="0"/>
+        </a:xfrm>
+      </p:grpSpPr>
+      <p:sp>
+        <p:nvSpPr>
+          <p:cNvPr id="2" name="Объект 1"/>
+          <p:cNvSpPr>
+            <a:spLocks noGrp="1"/>
+          </p:cNvSpPr>
+          <p:nvPr>
+            <p:ph idx="1"/>
+          </p:nvPr>
+        </p:nvSpPr>
+        <p:spPr>
+          <a:xfrm>
             <a:off x="667656" y="1340768"/>
             <a:ext cx="7792775" cy="4896544"/>
           </a:xfrm>
@@ -8222,7 +8796,6 @@
               <a:rPr lang="ru-RU" sz="2400" dirty="0" smtClean="0"/>
               <a:t>Библиотеки:</a:t>
             </a:r>
-            <a:endParaRPr lang="ru-RU" sz="2400" dirty="0" smtClean="0"/>
           </a:p>
           <a:p>
             <a:pPr>
@@ -8461,7 +9034,7 @@
 </p:sld>
 </file>
 
-<file path=ppt/slides/slide6.xml><?xml version="1.0" encoding="utf-8"?>
+<file path=ppt/slides/slide7.xml><?xml version="1.0" encoding="utf-8"?>
 <p:sld xmlns:a="http://schemas.openxmlformats.org/drawingml/2006/main" xmlns:r="http://schemas.openxmlformats.org/officeDocument/2006/relationships" xmlns:p="http://schemas.openxmlformats.org/presentationml/2006/main">
   <p:cSld>
     <p:spTree>
@@ -8543,7 +9116,7 @@
         <p:spPr>
           <a:xfrm>
             <a:off x="251520" y="1556792"/>
-            <a:ext cx="6705600" cy="1549399"/>
+            <a:ext cx="7704856" cy="1549399"/>
           </a:xfrm>
         </p:spPr>
         <p:txBody>
@@ -8558,7 +9131,7 @@
             </a:pPr>
             <a:r>
               <a:rPr lang="ru-RU" sz="2200" dirty="0" smtClean="0"/>
-              <a:t>Набор функций с описанием к ним</a:t>
+              <a:t>Набор определенных функций с описанием к ним</a:t>
             </a:r>
           </a:p>
           <a:p>
@@ -8679,161 +9252,6 @@
 </p:sld>
 </file>
 
-<file path=ppt/slides/slide7.xml><?xml version="1.0" encoding="utf-8"?>
-<p:sld xmlns:a="http://schemas.openxmlformats.org/drawingml/2006/main" xmlns:r="http://schemas.openxmlformats.org/officeDocument/2006/relationships" xmlns:p="http://schemas.openxmlformats.org/presentationml/2006/main">
-  <p:cSld>
-    <p:spTree>
-      <p:nvGrpSpPr>
-        <p:cNvPr id="1" name=""/>
-        <p:cNvGrpSpPr/>
-        <p:nvPr/>
-      </p:nvGrpSpPr>
-      <p:grpSpPr>
-        <a:xfrm>
-          <a:off x="0" y="0"/>
-          <a:ext cx="0" cy="0"/>
-          <a:chOff x="0" y="0"/>
-          <a:chExt cx="0" cy="0"/>
-        </a:xfrm>
-      </p:grpSpPr>
-      <p:sp>
-        <p:nvSpPr>
-          <p:cNvPr id="2" name="Объект 1"/>
-          <p:cNvSpPr>
-            <a:spLocks noGrp="1"/>
-          </p:cNvSpPr>
-          <p:nvPr>
-            <p:ph idx="1"/>
-          </p:nvPr>
-        </p:nvSpPr>
-        <p:spPr>
-          <a:xfrm>
-            <a:off x="667656" y="2348880"/>
-            <a:ext cx="7792775" cy="3888432"/>
-          </a:xfrm>
-        </p:spPr>
-        <p:txBody>
-          <a:bodyPr>
-            <a:noAutofit/>
-          </a:bodyPr>
-          <a:lstStyle/>
-          <a:p>
-            <a:pPr>
-              <a:buFont typeface="Wingdings" panose="05000000000000000000" pitchFamily="2" charset="2"/>
-              <a:buChar char="v"/>
-            </a:pPr>
-            <a:r>
-              <a:rPr lang="ru-RU" sz="2400" dirty="0"/>
-              <a:t>Формируем матрицу всех возможных коалиций, где 1 – участники текущей коалиции, -1 – участники противоположной </a:t>
-            </a:r>
-            <a:r>
-              <a:rPr lang="ru-RU" sz="2400" dirty="0" smtClean="0"/>
-              <a:t>коалиции</a:t>
-            </a:r>
-          </a:p>
-          <a:p>
-            <a:pPr>
-              <a:buFont typeface="Wingdings" panose="05000000000000000000" pitchFamily="2" charset="2"/>
-              <a:buChar char="v"/>
-            </a:pPr>
-            <a:r>
-              <a:rPr lang="ru-RU" sz="2400" dirty="0"/>
-              <a:t>Делаем матричное перемножение матрицы коалиций и исследуемой матрицы</a:t>
-            </a:r>
-          </a:p>
-          <a:p>
-            <a:pPr>
-              <a:buFont typeface="Wingdings" panose="05000000000000000000" pitchFamily="2" charset="2"/>
-              <a:buChar char="v"/>
-            </a:pPr>
-            <a:r>
-              <a:rPr lang="ru-RU" sz="2400" dirty="0"/>
-              <a:t>Умножаем элементы соответствующие другой коалиции на минус </a:t>
-            </a:r>
-            <a:r>
-              <a:rPr lang="ru-RU" sz="2400" dirty="0" smtClean="0"/>
-              <a:t>один</a:t>
-            </a:r>
-          </a:p>
-          <a:p>
-            <a:pPr>
-              <a:buFont typeface="Wingdings" panose="05000000000000000000" pitchFamily="2" charset="2"/>
-              <a:buChar char="v"/>
-            </a:pPr>
-            <a:r>
-              <a:rPr lang="ru-RU" sz="2400" dirty="0"/>
-              <a:t>Смотрим коалиции, где все выигрыши больше, либо равны нулю. Это равновесные </a:t>
-            </a:r>
-            <a:r>
-              <a:rPr lang="ru-RU" sz="2400" dirty="0" smtClean="0"/>
-              <a:t>разбиения</a:t>
-            </a:r>
-            <a:endParaRPr lang="ru-RU" sz="2400" dirty="0"/>
-          </a:p>
-          <a:p>
-            <a:pPr>
-              <a:buFont typeface="Wingdings" panose="05000000000000000000" pitchFamily="2" charset="2"/>
-              <a:buChar char="v"/>
-            </a:pPr>
-            <a:endParaRPr lang="ru-RU" sz="2400" dirty="0"/>
-          </a:p>
-          <a:p>
-            <a:pPr>
-              <a:buFont typeface="Wingdings" panose="05000000000000000000" pitchFamily="2" charset="2"/>
-              <a:buChar char="v"/>
-            </a:pPr>
-            <a:endParaRPr lang="ru-RU" sz="2400" dirty="0" smtClean="0"/>
-          </a:p>
-        </p:txBody>
-      </p:sp>
-      <p:sp>
-        <p:nvSpPr>
-          <p:cNvPr id="3" name="Заголовок 2"/>
-          <p:cNvSpPr>
-            <a:spLocks noGrp="1"/>
-          </p:cNvSpPr>
-          <p:nvPr>
-            <p:ph type="title"/>
-          </p:nvPr>
-        </p:nvSpPr>
-        <p:spPr>
-          <a:xfrm>
-            <a:off x="683568" y="404664"/>
-            <a:ext cx="7776864" cy="914400"/>
-          </a:xfrm>
-        </p:spPr>
-        <p:txBody>
-          <a:bodyPr/>
-          <a:lstStyle/>
-          <a:p>
-            <a:r>
-              <a:rPr lang="ru-RU" sz="4000" dirty="0" smtClean="0"/>
-              <a:t>Алгоритм поиска равновесий</a:t>
-            </a:r>
-            <a:endParaRPr lang="ru-RU" sz="4000" dirty="0"/>
-          </a:p>
-        </p:txBody>
-      </p:sp>
-    </p:spTree>
-    <p:extLst>
-      <p:ext uri="{BB962C8B-B14F-4D97-AF65-F5344CB8AC3E}">
-        <p14:creationId xmlns:p14="http://schemas.microsoft.com/office/powerpoint/2010/main" val="4285351295"/>
-      </p:ext>
-    </p:extLst>
-  </p:cSld>
-  <p:clrMapOvr>
-    <a:masterClrMapping/>
-  </p:clrMapOvr>
-  <p:timing>
-    <p:tnLst>
-      <p:par>
-        <p:cTn id="1" dur="indefinite" restart="never" nodeType="tmRoot"/>
-      </p:par>
-    </p:tnLst>
-  </p:timing>
-</p:sld>
-</file>
-
 <file path=ppt/slides/slide8.xml><?xml version="1.0" encoding="utf-8"?>
 <p:sld xmlns:a="http://schemas.openxmlformats.org/drawingml/2006/main" xmlns:r="http://schemas.openxmlformats.org/officeDocument/2006/relationships" xmlns:p="http://schemas.openxmlformats.org/presentationml/2006/main">
   <p:cSld>
@@ -8853,6 +9271,96 @@
       </p:grpSpPr>
       <p:sp>
         <p:nvSpPr>
+          <p:cNvPr id="2" name="Объект 1"/>
+          <p:cNvSpPr>
+            <a:spLocks noGrp="1"/>
+          </p:cNvSpPr>
+          <p:nvPr>
+            <p:ph idx="1"/>
+          </p:nvPr>
+        </p:nvSpPr>
+        <p:spPr>
+          <a:xfrm>
+            <a:off x="667656" y="2348880"/>
+            <a:ext cx="7792775" cy="3888432"/>
+          </a:xfrm>
+        </p:spPr>
+        <p:txBody>
+          <a:bodyPr>
+            <a:noAutofit/>
+          </a:bodyPr>
+          <a:lstStyle/>
+          <a:p>
+            <a:pPr>
+              <a:buFont typeface="Wingdings" panose="05000000000000000000" pitchFamily="2" charset="2"/>
+              <a:buChar char="v"/>
+            </a:pPr>
+            <a:r>
+              <a:rPr lang="ru-RU" sz="2400" dirty="0"/>
+              <a:t>Формируем матрицу всех возможных коалиций, где 1 – участники текущей коалиции, -1 – </a:t>
+            </a:r>
+            <a:r>
+              <a:rPr lang="ru-RU" sz="2400" dirty="0" smtClean="0"/>
+              <a:t>участники другой коалиции</a:t>
+            </a:r>
+          </a:p>
+          <a:p>
+            <a:pPr>
+              <a:buFont typeface="Wingdings" panose="05000000000000000000" pitchFamily="2" charset="2"/>
+              <a:buChar char="v"/>
+            </a:pPr>
+            <a:r>
+              <a:rPr lang="ru-RU" sz="2400" dirty="0"/>
+              <a:t>Делаем матричное перемножение матрицы коалиций и исследуемой матрицы</a:t>
+            </a:r>
+          </a:p>
+          <a:p>
+            <a:pPr>
+              <a:buFont typeface="Wingdings" panose="05000000000000000000" pitchFamily="2" charset="2"/>
+              <a:buChar char="v"/>
+            </a:pPr>
+            <a:r>
+              <a:rPr lang="ru-RU" sz="2400" dirty="0"/>
+              <a:t>Умножаем элементы соответствующие другой коалиции на минус </a:t>
+            </a:r>
+            <a:r>
+              <a:rPr lang="ru-RU" sz="2400" dirty="0" smtClean="0"/>
+              <a:t>один</a:t>
+            </a:r>
+          </a:p>
+          <a:p>
+            <a:pPr>
+              <a:buFont typeface="Wingdings" panose="05000000000000000000" pitchFamily="2" charset="2"/>
+              <a:buChar char="v"/>
+            </a:pPr>
+            <a:r>
+              <a:rPr lang="ru-RU" sz="2400" dirty="0"/>
+              <a:t>Смотрим коалиции, где все выигрыши больше, либо равны нулю. Это равновесные </a:t>
+            </a:r>
+            <a:r>
+              <a:rPr lang="ru-RU" sz="2400" dirty="0" smtClean="0"/>
+              <a:t>разбиения</a:t>
+            </a:r>
+            <a:endParaRPr lang="ru-RU" sz="2400" dirty="0"/>
+          </a:p>
+          <a:p>
+            <a:pPr>
+              <a:buFont typeface="Wingdings" panose="05000000000000000000" pitchFamily="2" charset="2"/>
+              <a:buChar char="v"/>
+            </a:pPr>
+            <a:endParaRPr lang="ru-RU" sz="2400" dirty="0"/>
+          </a:p>
+          <a:p>
+            <a:pPr>
+              <a:buFont typeface="Wingdings" panose="05000000000000000000" pitchFamily="2" charset="2"/>
+              <a:buChar char="v"/>
+            </a:pPr>
+            <a:endParaRPr lang="ru-RU" sz="2400" dirty="0" smtClean="0"/>
+          </a:p>
+        </p:txBody>
+      </p:sp>
+      <p:sp>
+        <p:nvSpPr>
           <p:cNvPr id="3" name="Заголовок 2"/>
           <p:cNvSpPr>
             <a:spLocks noGrp="1"/>
@@ -8864,7 +9372,7 @@
         <p:spPr>
           <a:xfrm>
             <a:off x="683568" y="404664"/>
-            <a:ext cx="7776864" cy="1512168"/>
+            <a:ext cx="7776864" cy="914400"/>
           </a:xfrm>
         </p:spPr>
         <p:txBody>
@@ -8872,317 +9380,17 @@
           <a:lstStyle/>
           <a:p>
             <a:r>
-              <a:rPr lang="ru-RU" sz="4800" dirty="0"/>
-              <a:t>Алгоритм поиска </a:t>
-            </a:r>
-            <a:r>
-              <a:rPr lang="ru-RU" sz="4800" dirty="0" smtClean="0"/>
-              <a:t>равновесий. Пример</a:t>
-            </a:r>
-            <a:endParaRPr lang="ru-RU" sz="4800" dirty="0"/>
-          </a:p>
-        </p:txBody>
-      </p:sp>
-      <p:sp>
-        <p:nvSpPr>
-          <p:cNvPr id="4" name="TextBox 3"/>
-          <p:cNvSpPr txBox="1"/>
-          <p:nvPr/>
-        </p:nvSpPr>
-        <p:spPr>
-          <a:xfrm>
-            <a:off x="323528" y="1539307"/>
-            <a:ext cx="1008112" cy="3154710"/>
-          </a:xfrm>
-          <a:prstGeom prst="rect">
-            <a:avLst/>
-          </a:prstGeom>
-          <a:noFill/>
-        </p:spPr>
-        <p:txBody>
-          <a:bodyPr wrap="square" rtlCol="0">
-            <a:spAutoFit/>
-          </a:bodyPr>
-          <a:lstStyle/>
-          <a:p>
-            <a:r>
-              <a:rPr lang="en-US" sz="19900" dirty="0"/>
-              <a:t>[</a:t>
-            </a:r>
-            <a:endParaRPr lang="ru-RU" sz="19900" dirty="0"/>
-          </a:p>
-        </p:txBody>
-      </p:sp>
-      <p:sp>
-        <p:nvSpPr>
-          <p:cNvPr id="5" name="TextBox 4"/>
-          <p:cNvSpPr txBox="1"/>
-          <p:nvPr/>
-        </p:nvSpPr>
-        <p:spPr>
-          <a:xfrm>
-            <a:off x="2483768" y="1536309"/>
-            <a:ext cx="1008112" cy="3154710"/>
-          </a:xfrm>
-          <a:prstGeom prst="rect">
-            <a:avLst/>
-          </a:prstGeom>
-          <a:noFill/>
-        </p:spPr>
-        <p:txBody>
-          <a:bodyPr wrap="square" rtlCol="0">
-            <a:spAutoFit/>
-          </a:bodyPr>
-          <a:lstStyle/>
-          <a:p>
-            <a:r>
-              <a:rPr lang="en-US" sz="19900" dirty="0"/>
-              <a:t>]</a:t>
-            </a:r>
-            <a:endParaRPr lang="ru-RU" sz="19900" dirty="0"/>
-          </a:p>
-        </p:txBody>
-      </p:sp>
-      <p:sp>
-        <p:nvSpPr>
-          <p:cNvPr id="2" name="TextBox 1"/>
-          <p:cNvSpPr txBox="1"/>
-          <p:nvPr/>
-        </p:nvSpPr>
-        <p:spPr>
-          <a:xfrm>
-            <a:off x="1331640" y="2465089"/>
-            <a:ext cx="1512168" cy="1754326"/>
-          </a:xfrm>
-          <a:prstGeom prst="rect">
-            <a:avLst/>
-          </a:prstGeom>
-          <a:noFill/>
-        </p:spPr>
-        <p:txBody>
-          <a:bodyPr wrap="square" rtlCol="0">
-            <a:spAutoFit/>
-          </a:bodyPr>
-          <a:lstStyle/>
-          <a:p>
-            <a:r>
-              <a:rPr lang="en-US" sz="3600" dirty="0" smtClean="0"/>
-              <a:t>0 1  2</a:t>
-            </a:r>
-          </a:p>
-          <a:p>
-            <a:r>
-              <a:rPr lang="en-US" sz="3600" dirty="0" smtClean="0"/>
-              <a:t>1 0 -1</a:t>
-            </a:r>
-          </a:p>
-          <a:p>
-            <a:r>
-              <a:rPr lang="en-US" sz="3600" dirty="0" smtClean="0"/>
-              <a:t>2 -1 0</a:t>
-            </a:r>
-            <a:endParaRPr lang="ru-RU" sz="3600" dirty="0"/>
-          </a:p>
-        </p:txBody>
-      </p:sp>
-      <p:sp>
-        <p:nvSpPr>
-          <p:cNvPr id="7" name="TextBox 6"/>
-          <p:cNvSpPr txBox="1"/>
-          <p:nvPr/>
-        </p:nvSpPr>
-        <p:spPr>
-          <a:xfrm>
-            <a:off x="3682256" y="2880587"/>
-            <a:ext cx="648072" cy="923330"/>
-          </a:xfrm>
-          <a:prstGeom prst="rect">
-            <a:avLst/>
-          </a:prstGeom>
-          <a:noFill/>
-        </p:spPr>
-        <p:txBody>
-          <a:bodyPr wrap="square" rtlCol="0">
-            <a:spAutoFit/>
-          </a:bodyPr>
-          <a:lstStyle/>
-          <a:p>
-            <a:r>
-              <a:rPr lang="en-US" sz="5400" dirty="0" smtClean="0"/>
-              <a:t>x</a:t>
-            </a:r>
-            <a:endParaRPr lang="ru-RU" sz="5400" dirty="0"/>
-          </a:p>
-        </p:txBody>
-      </p:sp>
-      <p:sp>
-        <p:nvSpPr>
-          <p:cNvPr id="8" name="TextBox 7"/>
-          <p:cNvSpPr txBox="1"/>
-          <p:nvPr/>
-        </p:nvSpPr>
-        <p:spPr>
-          <a:xfrm>
-            <a:off x="4499992" y="2521523"/>
-            <a:ext cx="756084" cy="1754326"/>
-          </a:xfrm>
-          <a:prstGeom prst="rect">
-            <a:avLst/>
-          </a:prstGeom>
-          <a:noFill/>
-        </p:spPr>
-        <p:txBody>
-          <a:bodyPr wrap="square" rtlCol="0">
-            <a:spAutoFit/>
-          </a:bodyPr>
-          <a:lstStyle/>
-          <a:p>
-            <a:r>
-              <a:rPr lang="en-US" sz="3600" dirty="0" smtClean="0"/>
-              <a:t> 1</a:t>
-            </a:r>
-          </a:p>
-          <a:p>
-            <a:r>
-              <a:rPr lang="en-US" sz="3600" dirty="0" smtClean="0"/>
-              <a:t>-1</a:t>
-            </a:r>
-          </a:p>
-          <a:p>
-            <a:r>
-              <a:rPr lang="en-US" sz="3600" dirty="0" smtClean="0"/>
-              <a:t> 1</a:t>
-            </a:r>
-          </a:p>
-        </p:txBody>
-      </p:sp>
-      <p:pic>
-        <p:nvPicPr>
-          <p:cNvPr id="1026" name="Picture 2"/>
-          <p:cNvPicPr>
-            <a:picLocks noChangeAspect="1" noChangeArrowheads="1"/>
-          </p:cNvPicPr>
-          <p:nvPr/>
-        </p:nvPicPr>
-        <p:blipFill rotWithShape="1">
-          <a:blip r:embed="rId2">
-            <a:extLst>
-              <a:ext uri="{28A0092B-C50C-407E-A947-70E740481C1C}">
-                <a14:useLocalDpi xmlns:a14="http://schemas.microsoft.com/office/drawing/2010/main" val="0"/>
-              </a:ext>
-            </a:extLst>
-          </a:blip>
-          <a:srcRect l="43171" t="33094" r="29722" b="17857"/>
-          <a:stretch/>
-        </p:blipFill>
-        <p:spPr bwMode="auto">
-          <a:xfrm>
-            <a:off x="5581346" y="4258392"/>
-            <a:ext cx="2555372" cy="2599608"/>
-          </a:xfrm>
-          <a:prstGeom prst="rect">
-            <a:avLst/>
-          </a:prstGeom>
-          <a:noFill/>
-          <a:ln>
-            <a:noFill/>
-          </a:ln>
-          <a:extLst>
-            <a:ext uri="{909E8E84-426E-40DD-AFC4-6F175D3DCCD1}">
-              <a14:hiddenFill xmlns:a14="http://schemas.microsoft.com/office/drawing/2010/main">
-                <a:solidFill>
-                  <a:schemeClr val="accent1"/>
-                </a:solidFill>
-              </a14:hiddenFill>
-            </a:ext>
-            <a:ext uri="{91240B29-F687-4F45-9708-019B960494DF}">
-              <a14:hiddenLine xmlns:a14="http://schemas.microsoft.com/office/drawing/2010/main" w="9525">
-                <a:solidFill>
-                  <a:schemeClr val="tx1"/>
-                </a:solidFill>
-                <a:miter lim="800000"/>
-                <a:headEnd/>
-                <a:tailEnd/>
-              </a14:hiddenLine>
-            </a:ext>
-          </a:extLst>
-        </p:spPr>
-      </p:pic>
-      <p:sp>
-        <p:nvSpPr>
-          <p:cNvPr id="12" name="TextBox 11"/>
-          <p:cNvSpPr txBox="1"/>
-          <p:nvPr/>
-        </p:nvSpPr>
-        <p:spPr>
-          <a:xfrm>
-            <a:off x="5580112" y="2937021"/>
-            <a:ext cx="648072" cy="923330"/>
-          </a:xfrm>
-          <a:prstGeom prst="rect">
-            <a:avLst/>
-          </a:prstGeom>
-          <a:noFill/>
-        </p:spPr>
-        <p:txBody>
-          <a:bodyPr wrap="square" rtlCol="0">
-            <a:spAutoFit/>
-          </a:bodyPr>
-          <a:lstStyle/>
-          <a:p>
-            <a:r>
-              <a:rPr lang="en-US" sz="5400" dirty="0"/>
-              <a:t>=</a:t>
-            </a:r>
-            <a:endParaRPr lang="ru-RU" sz="5400" dirty="0"/>
-          </a:p>
-        </p:txBody>
-      </p:sp>
-      <p:sp>
-        <p:nvSpPr>
-          <p:cNvPr id="15" name="TextBox 14"/>
-          <p:cNvSpPr txBox="1"/>
-          <p:nvPr/>
-        </p:nvSpPr>
-        <p:spPr>
-          <a:xfrm>
-            <a:off x="6317282" y="2521523"/>
-            <a:ext cx="756084" cy="1754326"/>
-          </a:xfrm>
-          <a:prstGeom prst="rect">
-            <a:avLst/>
-          </a:prstGeom>
-          <a:noFill/>
-        </p:spPr>
-        <p:txBody>
-          <a:bodyPr wrap="square" rtlCol="0">
-            <a:spAutoFit/>
-          </a:bodyPr>
-          <a:lstStyle/>
-          <a:p>
-            <a:r>
-              <a:rPr lang="en-US" sz="3600" dirty="0" smtClean="0"/>
-              <a:t> 1</a:t>
-            </a:r>
-          </a:p>
-          <a:p>
-            <a:r>
-              <a:rPr lang="en-US" sz="3600" dirty="0" smtClean="0"/>
-              <a:t> 0</a:t>
-            </a:r>
-          </a:p>
-          <a:p>
-            <a:r>
-              <a:rPr lang="en-US" sz="3600" dirty="0" smtClean="0"/>
-              <a:t> 3</a:t>
-            </a:r>
+              <a:rPr lang="ru-RU" sz="4000" dirty="0" smtClean="0"/>
+              <a:t>Алгоритм поиска равновесий</a:t>
+            </a:r>
+            <a:endParaRPr lang="ru-RU" sz="4000" dirty="0"/>
           </a:p>
         </p:txBody>
       </p:sp>
     </p:spTree>
     <p:extLst>
       <p:ext uri="{BB962C8B-B14F-4D97-AF65-F5344CB8AC3E}">
-        <p14:creationId xmlns:p14="http://schemas.microsoft.com/office/powerpoint/2010/main" val="665096758"/>
+        <p14:creationId xmlns:p14="http://schemas.microsoft.com/office/powerpoint/2010/main" val="4285351295"/>
       </p:ext>
     </p:extLst>
   </p:cSld>
@@ -9229,7 +9437,7 @@
         <p:spPr>
           <a:xfrm>
             <a:off x="683568" y="404664"/>
-            <a:ext cx="7776864" cy="914400"/>
+            <a:ext cx="7776864" cy="1512168"/>
           </a:xfrm>
         </p:spPr>
         <p:txBody>
@@ -9237,133 +9445,269 @@
           <a:lstStyle/>
           <a:p>
             <a:r>
-              <a:rPr lang="ru-RU" sz="4000" dirty="0" smtClean="0"/>
-              <a:t>Кол-во графов с равновесиями</a:t>
-            </a:r>
-            <a:endParaRPr lang="ru-RU" sz="4000" dirty="0"/>
-          </a:p>
-        </p:txBody>
-      </p:sp>
-      <p:graphicFrame>
-        <p:nvGraphicFramePr>
-          <p:cNvPr id="4" name="Диаграмма 3"/>
-          <p:cNvGraphicFramePr/>
-          <p:nvPr>
-            <p:extLst>
-              <p:ext uri="{D42A27DB-BD31-4B8C-83A1-F6EECF244321}">
-                <p14:modId xmlns:p14="http://schemas.microsoft.com/office/powerpoint/2010/main" val="2798858105"/>
-              </p:ext>
-            </p:extLst>
-          </p:nvPr>
-        </p:nvGraphicFramePr>
-        <p:xfrm>
-          <a:off x="539552" y="1484784"/>
-          <a:ext cx="2399928" cy="2608064"/>
-        </p:xfrm>
-        <a:graphic>
-          <a:graphicData uri="http://schemas.openxmlformats.org/drawingml/2006/chart">
-            <c:chart xmlns:c="http://schemas.openxmlformats.org/drawingml/2006/chart" xmlns:r="http://schemas.openxmlformats.org/officeDocument/2006/relationships" r:id="rId2"/>
-          </a:graphicData>
-        </a:graphic>
-      </p:graphicFrame>
-      <p:graphicFrame>
-        <p:nvGraphicFramePr>
-          <p:cNvPr id="9" name="Диаграмма 8"/>
-          <p:cNvGraphicFramePr/>
-          <p:nvPr>
-            <p:extLst>
-              <p:ext uri="{D42A27DB-BD31-4B8C-83A1-F6EECF244321}">
-                <p14:modId xmlns:p14="http://schemas.microsoft.com/office/powerpoint/2010/main" val="903869551"/>
-              </p:ext>
-            </p:extLst>
-          </p:nvPr>
-        </p:nvGraphicFramePr>
-        <p:xfrm>
-          <a:off x="539552" y="4077072"/>
-          <a:ext cx="2399928" cy="2608064"/>
-        </p:xfrm>
-        <a:graphic>
-          <a:graphicData uri="http://schemas.openxmlformats.org/drawingml/2006/chart">
-            <c:chart xmlns:c="http://schemas.openxmlformats.org/drawingml/2006/chart" xmlns:r="http://schemas.openxmlformats.org/officeDocument/2006/relationships" r:id="rId3"/>
-          </a:graphicData>
-        </a:graphic>
-      </p:graphicFrame>
-      <p:graphicFrame>
-        <p:nvGraphicFramePr>
-          <p:cNvPr id="10" name="Диаграмма 9"/>
-          <p:cNvGraphicFramePr/>
-          <p:nvPr>
-            <p:extLst>
-              <p:ext uri="{D42A27DB-BD31-4B8C-83A1-F6EECF244321}">
-                <p14:modId xmlns:p14="http://schemas.microsoft.com/office/powerpoint/2010/main" val="409462323"/>
-              </p:ext>
-            </p:extLst>
-          </p:nvPr>
-        </p:nvGraphicFramePr>
-        <p:xfrm>
-          <a:off x="3851920" y="1484784"/>
-          <a:ext cx="2399928" cy="2608064"/>
-        </p:xfrm>
-        <a:graphic>
-          <a:graphicData uri="http://schemas.openxmlformats.org/drawingml/2006/chart">
-            <c:chart xmlns:c="http://schemas.openxmlformats.org/drawingml/2006/chart" xmlns:r="http://schemas.openxmlformats.org/officeDocument/2006/relationships" r:id="rId4"/>
-          </a:graphicData>
-        </a:graphic>
-      </p:graphicFrame>
-      <p:graphicFrame>
-        <p:nvGraphicFramePr>
-          <p:cNvPr id="11" name="Диаграмма 10"/>
-          <p:cNvGraphicFramePr/>
-          <p:nvPr>
-            <p:extLst>
-              <p:ext uri="{D42A27DB-BD31-4B8C-83A1-F6EECF244321}">
-                <p14:modId xmlns:p14="http://schemas.microsoft.com/office/powerpoint/2010/main" val="508284211"/>
-              </p:ext>
-            </p:extLst>
-          </p:nvPr>
-        </p:nvGraphicFramePr>
-        <p:xfrm>
-          <a:off x="3851920" y="4077072"/>
-          <a:ext cx="2399928" cy="2608064"/>
-        </p:xfrm>
-        <a:graphic>
-          <a:graphicData uri="http://schemas.openxmlformats.org/drawingml/2006/chart">
-            <c:chart xmlns:c="http://schemas.openxmlformats.org/drawingml/2006/chart" xmlns:r="http://schemas.openxmlformats.org/officeDocument/2006/relationships" r:id="rId5"/>
-          </a:graphicData>
-        </a:graphic>
-      </p:graphicFrame>
-      <p:sp>
-        <p:nvSpPr>
-          <p:cNvPr id="13" name="Прямоугольник 12"/>
-          <p:cNvSpPr/>
+              <a:rPr lang="ru-RU" sz="4800" dirty="0"/>
+              <a:t>Алгоритм поиска </a:t>
+            </a:r>
+            <a:r>
+              <a:rPr lang="ru-RU" sz="4800" dirty="0" smtClean="0"/>
+              <a:t>равновесий. Пример</a:t>
+            </a:r>
+            <a:endParaRPr lang="ru-RU" sz="4800" dirty="0"/>
+          </a:p>
+        </p:txBody>
+      </p:sp>
+      <p:sp>
+        <p:nvSpPr>
+          <p:cNvPr id="2" name="TextBox 1"/>
+          <p:cNvSpPr txBox="1"/>
           <p:nvPr/>
         </p:nvSpPr>
         <p:spPr>
           <a:xfrm>
-            <a:off x="6615991" y="2988883"/>
-            <a:ext cx="432048" cy="432048"/>
+            <a:off x="1331640" y="2275591"/>
+            <a:ext cx="1512168" cy="1754326"/>
           </a:xfrm>
           <a:prstGeom prst="rect">
             <a:avLst/>
           </a:prstGeom>
-          <a:solidFill>
-            <a:srgbClr val="FF0000"/>
-          </a:solidFill>
+          <a:noFill/>
+        </p:spPr>
+        <p:txBody>
+          <a:bodyPr wrap="square" rtlCol="0">
+            <a:spAutoFit/>
+          </a:bodyPr>
+          <a:lstStyle/>
+          <a:p>
+            <a:r>
+              <a:rPr lang="en-US" sz="3600" dirty="0" smtClean="0"/>
+              <a:t>0 1  2</a:t>
+            </a:r>
+          </a:p>
+          <a:p>
+            <a:r>
+              <a:rPr lang="en-US" sz="3600" dirty="0" smtClean="0"/>
+              <a:t>1 0 </a:t>
+            </a:r>
+            <a:r>
+              <a:rPr lang="en-US" sz="3600" dirty="0" smtClean="0"/>
+              <a:t>-</a:t>
+            </a:r>
+            <a:r>
+              <a:rPr lang="ru-RU" sz="3600" dirty="0" smtClean="0"/>
+              <a:t>2</a:t>
+            </a:r>
+            <a:endParaRPr lang="en-US" sz="3600" dirty="0" smtClean="0"/>
+          </a:p>
+          <a:p>
+            <a:r>
+              <a:rPr lang="en-US" sz="3600" dirty="0" smtClean="0"/>
+              <a:t>2 </a:t>
+            </a:r>
+            <a:r>
+              <a:rPr lang="en-US" sz="3600" dirty="0" smtClean="0"/>
+              <a:t>-</a:t>
+            </a:r>
+            <a:r>
+              <a:rPr lang="ru-RU" sz="3600" dirty="0" smtClean="0"/>
+              <a:t>2</a:t>
+            </a:r>
+            <a:r>
+              <a:rPr lang="en-US" sz="3600" dirty="0" smtClean="0"/>
+              <a:t> </a:t>
+            </a:r>
+            <a:r>
+              <a:rPr lang="en-US" sz="3600" dirty="0" smtClean="0"/>
+              <a:t>0</a:t>
+            </a:r>
+            <a:endParaRPr lang="ru-RU" sz="3600" dirty="0"/>
+          </a:p>
+        </p:txBody>
+      </p:sp>
+      <p:sp>
+        <p:nvSpPr>
+          <p:cNvPr id="7" name="TextBox 6"/>
+          <p:cNvSpPr txBox="1"/>
+          <p:nvPr/>
+        </p:nvSpPr>
+        <p:spPr>
+          <a:xfrm>
+            <a:off x="3275856" y="2691089"/>
+            <a:ext cx="648072" cy="923330"/>
+          </a:xfrm>
+          <a:prstGeom prst="rect">
+            <a:avLst/>
+          </a:prstGeom>
+          <a:noFill/>
+        </p:spPr>
+        <p:txBody>
+          <a:bodyPr wrap="square" rtlCol="0">
+            <a:spAutoFit/>
+          </a:bodyPr>
+          <a:lstStyle/>
+          <a:p>
+            <a:r>
+              <a:rPr lang="en-US" sz="5400" dirty="0" smtClean="0"/>
+              <a:t>x</a:t>
+            </a:r>
+            <a:endParaRPr lang="ru-RU" sz="5400" dirty="0"/>
+          </a:p>
+        </p:txBody>
+      </p:sp>
+      <p:sp>
+        <p:nvSpPr>
+          <p:cNvPr id="8" name="TextBox 7"/>
+          <p:cNvSpPr txBox="1"/>
+          <p:nvPr/>
+        </p:nvSpPr>
+        <p:spPr>
+          <a:xfrm>
+            <a:off x="4247964" y="2351675"/>
+            <a:ext cx="756084" cy="1754326"/>
+          </a:xfrm>
+          <a:prstGeom prst="rect">
+            <a:avLst/>
+          </a:prstGeom>
+          <a:noFill/>
+        </p:spPr>
+        <p:txBody>
+          <a:bodyPr wrap="square" rtlCol="0">
+            <a:spAutoFit/>
+          </a:bodyPr>
+          <a:lstStyle/>
+          <a:p>
+            <a:r>
+              <a:rPr lang="en-US" sz="3600" dirty="0" smtClean="0"/>
+              <a:t> 1</a:t>
+            </a:r>
+          </a:p>
+          <a:p>
+            <a:r>
+              <a:rPr lang="en-US" sz="3600" dirty="0" smtClean="0"/>
+              <a:t>-1</a:t>
+            </a:r>
+          </a:p>
+          <a:p>
+            <a:r>
+              <a:rPr lang="en-US" sz="3600" dirty="0" smtClean="0"/>
+              <a:t> 1</a:t>
+            </a:r>
+          </a:p>
+        </p:txBody>
+      </p:sp>
+      <p:sp>
+        <p:nvSpPr>
+          <p:cNvPr id="12" name="TextBox 11"/>
+          <p:cNvSpPr txBox="1"/>
+          <p:nvPr/>
+        </p:nvSpPr>
+        <p:spPr>
+          <a:xfrm>
+            <a:off x="5745070" y="2767173"/>
+            <a:ext cx="648072" cy="923330"/>
+          </a:xfrm>
+          <a:prstGeom prst="rect">
+            <a:avLst/>
+          </a:prstGeom>
+          <a:noFill/>
+        </p:spPr>
+        <p:txBody>
+          <a:bodyPr wrap="square" rtlCol="0">
+            <a:spAutoFit/>
+          </a:bodyPr>
+          <a:lstStyle/>
+          <a:p>
+            <a:r>
+              <a:rPr lang="en-US" sz="5400" dirty="0"/>
+              <a:t>=</a:t>
+            </a:r>
+            <a:endParaRPr lang="ru-RU" sz="5400" dirty="0"/>
+          </a:p>
+        </p:txBody>
+      </p:sp>
+      <p:sp>
+        <p:nvSpPr>
+          <p:cNvPr id="15" name="TextBox 14"/>
+          <p:cNvSpPr txBox="1"/>
+          <p:nvPr/>
+        </p:nvSpPr>
+        <p:spPr>
+          <a:xfrm>
+            <a:off x="7036131" y="2351675"/>
+            <a:ext cx="756084" cy="1754326"/>
+          </a:xfrm>
+          <a:prstGeom prst="rect">
+            <a:avLst/>
+          </a:prstGeom>
+          <a:noFill/>
+        </p:spPr>
+        <p:txBody>
+          <a:bodyPr wrap="square" rtlCol="0">
+            <a:spAutoFit/>
+          </a:bodyPr>
+          <a:lstStyle/>
+          <a:p>
+            <a:r>
+              <a:rPr lang="en-US" sz="3600" dirty="0" smtClean="0"/>
+              <a:t> 1</a:t>
+            </a:r>
+          </a:p>
+          <a:p>
+            <a:r>
+              <a:rPr lang="en-US" sz="3600" dirty="0" smtClean="0"/>
+              <a:t> </a:t>
+            </a:r>
+            <a:r>
+              <a:rPr lang="ru-RU" sz="3600" dirty="0"/>
+              <a:t>1</a:t>
+            </a:r>
+            <a:endParaRPr lang="en-US" sz="3600" dirty="0" smtClean="0"/>
+          </a:p>
+          <a:p>
+            <a:r>
+              <a:rPr lang="en-US" sz="3600" dirty="0" smtClean="0"/>
+              <a:t> </a:t>
+            </a:r>
+            <a:r>
+              <a:rPr lang="ru-RU" sz="3600" dirty="0" smtClean="0"/>
+              <a:t>4</a:t>
+            </a:r>
+            <a:endParaRPr lang="en-US" sz="3600" dirty="0" smtClean="0"/>
+          </a:p>
+        </p:txBody>
+      </p:sp>
+      <p:sp>
+        <p:nvSpPr>
+          <p:cNvPr id="6" name="Двойные круглые скобки 5"/>
+          <p:cNvSpPr/>
+          <p:nvPr/>
+        </p:nvSpPr>
+        <p:spPr>
+          <a:xfrm>
+            <a:off x="1044655" y="2140904"/>
+            <a:ext cx="1800200" cy="2023700"/>
+          </a:xfrm>
+          <a:prstGeom prst="bracketPair">
+            <a:avLst/>
+          </a:prstGeom>
+          <a:noFill/>
+          <a:ln w="76200">
+            <a:solidFill>
+              <a:schemeClr val="tx1"/>
+            </a:solidFill>
+          </a:ln>
         </p:spPr>
         <p:style>
-          <a:lnRef idx="2">
-            <a:schemeClr val="accent1">
-              <a:shade val="50000"/>
-            </a:schemeClr>
+          <a:lnRef idx="1">
+            <a:schemeClr val="accent1"/>
           </a:lnRef>
-          <a:fillRef idx="1">
+          <a:fillRef idx="0">
             <a:schemeClr val="accent1"/>
           </a:fillRef>
           <a:effectRef idx="0">
             <a:schemeClr val="accent1"/>
           </a:effectRef>
           <a:fontRef idx="minor">
-            <a:schemeClr val="lt1"/>
+            <a:schemeClr val="tx1"/>
           </a:fontRef>
         </p:style>
         <p:txBody>
@@ -9377,36 +9721,37 @@
       </p:sp>
       <p:sp>
         <p:nvSpPr>
-          <p:cNvPr id="14" name="Прямоугольник 13"/>
+          <p:cNvPr id="13" name="Двойные круглые скобки 12"/>
           <p:cNvSpPr/>
           <p:nvPr/>
         </p:nvSpPr>
         <p:spPr>
           <a:xfrm>
-            <a:off x="6604429" y="4506563"/>
-            <a:ext cx="432048" cy="432048"/>
+            <a:off x="4067944" y="2216988"/>
+            <a:ext cx="936104" cy="2023700"/>
           </a:xfrm>
-          <a:prstGeom prst="rect">
+          <a:prstGeom prst="bracketPair">
             <a:avLst/>
           </a:prstGeom>
-          <a:solidFill>
-            <a:srgbClr val="92D050"/>
-          </a:solidFill>
+          <a:noFill/>
+          <a:ln w="76200">
+            <a:solidFill>
+              <a:schemeClr val="tx1"/>
+            </a:solidFill>
+          </a:ln>
         </p:spPr>
         <p:style>
-          <a:lnRef idx="2">
-            <a:schemeClr val="accent1">
-              <a:shade val="50000"/>
-            </a:schemeClr>
+          <a:lnRef idx="1">
+            <a:schemeClr val="accent1"/>
           </a:lnRef>
-          <a:fillRef idx="1">
+          <a:fillRef idx="0">
             <a:schemeClr val="accent1"/>
           </a:fillRef>
           <a:effectRef idx="0">
             <a:schemeClr val="accent1"/>
           </a:effectRef>
           <a:fontRef idx="minor">
-            <a:schemeClr val="lt1"/>
+            <a:schemeClr val="tx1"/>
           </a:fontRef>
         </p:style>
         <p:txBody>
@@ -9420,14 +9765,110 @@
       </p:sp>
       <p:sp>
         <p:nvSpPr>
-          <p:cNvPr id="15" name="TextBox 14"/>
+          <p:cNvPr id="14" name="Двойные круглые скобки 13"/>
+          <p:cNvSpPr/>
+          <p:nvPr/>
+        </p:nvSpPr>
+        <p:spPr>
+          <a:xfrm>
+            <a:off x="6864134" y="2216988"/>
+            <a:ext cx="936104" cy="2023700"/>
+          </a:xfrm>
+          <a:prstGeom prst="bracketPair">
+            <a:avLst/>
+          </a:prstGeom>
+          <a:noFill/>
+          <a:ln w="76200">
+            <a:solidFill>
+              <a:schemeClr val="tx1"/>
+            </a:solidFill>
+          </a:ln>
+        </p:spPr>
+        <p:style>
+          <a:lnRef idx="1">
+            <a:schemeClr val="accent1"/>
+          </a:lnRef>
+          <a:fillRef idx="0">
+            <a:schemeClr val="accent1"/>
+          </a:fillRef>
+          <a:effectRef idx="0">
+            <a:schemeClr val="accent1"/>
+          </a:effectRef>
+          <a:fontRef idx="minor">
+            <a:schemeClr val="tx1"/>
+          </a:fontRef>
+        </p:style>
+        <p:txBody>
+          <a:bodyPr rtlCol="0" anchor="ctr"/>
+          <a:lstStyle/>
+          <a:p>
+            <a:pPr algn="ctr"/>
+            <a:endParaRPr lang="ru-RU"/>
+          </a:p>
+        </p:txBody>
+      </p:sp>
+      <p:pic>
+        <p:nvPicPr>
+          <p:cNvPr id="2050" name="Picture 2"/>
+          <p:cNvPicPr>
+            <a:picLocks noChangeAspect="1" noChangeArrowheads="1"/>
+          </p:cNvPicPr>
+          <p:nvPr/>
+        </p:nvPicPr>
+        <p:blipFill rotWithShape="1">
+          <a:blip r:embed="rId2">
+            <a:extLst>
+              <a:ext uri="{28A0092B-C50C-407E-A947-70E740481C1C}">
+                <a14:useLocalDpi xmlns:a14="http://schemas.microsoft.com/office/drawing/2010/main" val="0"/>
+              </a:ext>
+            </a:extLst>
+          </a:blip>
+          <a:srcRect l="44156" t="31857" r="24925" b="25992"/>
+          <a:stretch/>
+        </p:blipFill>
+        <p:spPr bwMode="auto">
+          <a:xfrm>
+            <a:off x="3420225" y="4434807"/>
+            <a:ext cx="3167645" cy="2427814"/>
+          </a:xfrm>
+          <a:prstGeom prst="rect">
+            <a:avLst/>
+          </a:prstGeom>
+          <a:noFill/>
+          <a:ln>
+            <a:noFill/>
+          </a:ln>
+          <a:extLst>
+            <a:ext uri="{909E8E84-426E-40DD-AFC4-6F175D3DCCD1}">
+              <a14:hiddenFill xmlns:a14="http://schemas.microsoft.com/office/drawing/2010/main">
+                <a:solidFill>
+                  <a:schemeClr val="accent1"/>
+                </a:solidFill>
+              </a14:hiddenFill>
+            </a:ext>
+            <a:ext uri="{91240B29-F687-4F45-9708-019B960494DF}">
+              <a14:hiddenLine xmlns:a14="http://schemas.microsoft.com/office/drawing/2010/main" w="9525">
+                <a:solidFill>
+                  <a:schemeClr val="tx1"/>
+                </a:solidFill>
+                <a:miter lim="800000"/>
+                <a:headEnd/>
+                <a:tailEnd/>
+              </a14:hiddenLine>
+            </a:ext>
+          </a:extLst>
+        </p:spPr>
+      </p:pic>
+      <p:sp>
+        <p:nvSpPr>
+          <p:cNvPr id="4" name="TextBox 3"/>
           <p:cNvSpPr txBox="1"/>
           <p:nvPr/>
         </p:nvSpPr>
         <p:spPr>
           <a:xfrm>
-            <a:off x="7152726" y="2591157"/>
-            <a:ext cx="1800200" cy="923330"/>
+            <a:off x="5250093" y="2231863"/>
+            <a:ext cx="1644062" cy="830997"/>
           </a:xfrm>
           <a:prstGeom prst="rect">
             <a:avLst/>
@@ -9441,49 +9882,17 @@
           <a:lstStyle/>
           <a:p>
             <a:r>
-              <a:rPr lang="ru-RU" dirty="0" smtClean="0"/>
-              <a:t>Кол-во графов без равновесий</a:t>
-            </a:r>
-            <a:endParaRPr lang="ru-RU" dirty="0"/>
-          </a:p>
-        </p:txBody>
-      </p:sp>
-      <p:sp>
-        <p:nvSpPr>
-          <p:cNvPr id="16" name="TextBox 15"/>
-          <p:cNvSpPr txBox="1"/>
-          <p:nvPr/>
-        </p:nvSpPr>
-        <p:spPr>
-          <a:xfrm>
-            <a:off x="7152726" y="4260922"/>
-            <a:ext cx="1800200" cy="1200329"/>
-          </a:xfrm>
-          <a:prstGeom prst="rect">
-            <a:avLst/>
-          </a:prstGeom>
-          <a:noFill/>
-        </p:spPr>
-        <p:txBody>
-          <a:bodyPr wrap="square" rtlCol="0">
-            <a:spAutoFit/>
-          </a:bodyPr>
-          <a:lstStyle/>
-          <a:p>
-            <a:r>
-              <a:rPr lang="ru-RU" dirty="0" smtClean="0"/>
-              <a:t>Кол-во графов с равновесиями</a:t>
-            </a:r>
-          </a:p>
-          <a:p>
-            <a:endParaRPr lang="ru-RU" dirty="0"/>
+              <a:rPr lang="ru-RU" sz="1600" dirty="0" smtClean="0"/>
+              <a:t>Умножить второй элемент на -1</a:t>
+            </a:r>
+            <a:endParaRPr lang="ru-RU" sz="1600" dirty="0"/>
           </a:p>
         </p:txBody>
       </p:sp>
     </p:spTree>
     <p:extLst>
       <p:ext uri="{BB962C8B-B14F-4D97-AF65-F5344CB8AC3E}">
-        <p14:creationId xmlns:p14="http://schemas.microsoft.com/office/powerpoint/2010/main" val="112117566"/>
+        <p14:creationId xmlns:p14="http://schemas.microsoft.com/office/powerpoint/2010/main" val="665096758"/>
       </p:ext>
     </p:extLst>
   </p:cSld>

</xml_diff>